<commit_message>
Added problems to the channel estimation unit.
</commit_message>
<xml_diff>
--- a/lectures/Unit07_ChanEst.pptx
+++ b/lectures/Unit07_ChanEst.pptx
@@ -259,7 +259,7 @@
           <a:p>
             <a:fld id="{B7D6DDD3-D7E9-488B-B626-1E8285E424D8}" type="datetimeFigureOut">
               <a:rPr lang="en-US" smtClean="0"/>
-              <a:t>4/1/2021</a:t>
+              <a:t>4/2/2021</a:t>
             </a:fld>
             <a:endParaRPr lang="en-US"/>
           </a:p>
@@ -5234,6 +5234,287 @@
   <p:clrMapOvr>
     <a:masterClrMapping/>
   </p:clrMapOvr>
+  <p:timing>
+    <p:tnLst>
+      <p:par>
+        <p:cTn id="1" dur="indefinite" restart="never" nodeType="tmRoot">
+          <p:childTnLst>
+            <p:seq concurrent="1" nextAc="seek">
+              <p:cTn id="2" dur="indefinite" nodeType="mainSeq">
+                <p:childTnLst>
+                  <p:par>
+                    <p:cTn id="3" fill="hold">
+                      <p:stCondLst>
+                        <p:cond delay="indefinite"/>
+                      </p:stCondLst>
+                      <p:childTnLst>
+                        <p:par>
+                          <p:cTn id="4" fill="hold">
+                            <p:stCondLst>
+                              <p:cond delay="0"/>
+                            </p:stCondLst>
+                            <p:childTnLst>
+                              <p:par>
+                                <p:cTn id="5" presetID="10" presetClass="entr" presetSubtype="0" fill="hold" nodeType="clickEffect">
+                                  <p:stCondLst>
+                                    <p:cond delay="0"/>
+                                  </p:stCondLst>
+                                  <p:childTnLst>
+                                    <p:set>
+                                      <p:cBhvr>
+                                        <p:cTn id="6" dur="1" fill="hold">
+                                          <p:stCondLst>
+                                            <p:cond delay="0"/>
+                                          </p:stCondLst>
+                                        </p:cTn>
+                                        <p:tgtEl>
+                                          <p:spTgt spid="3">
+                                            <p:txEl>
+                                              <p:pRg st="3" end="3"/>
+                                            </p:txEl>
+                                          </p:spTgt>
+                                        </p:tgtEl>
+                                        <p:attrNameLst>
+                                          <p:attrName>style.visibility</p:attrName>
+                                        </p:attrNameLst>
+                                      </p:cBhvr>
+                                      <p:to>
+                                        <p:strVal val="visible"/>
+                                      </p:to>
+                                    </p:set>
+                                    <p:animEffect transition="in" filter="fade">
+                                      <p:cBhvr>
+                                        <p:cTn id="7" dur="500"/>
+                                        <p:tgtEl>
+                                          <p:spTgt spid="3">
+                                            <p:txEl>
+                                              <p:pRg st="3" end="3"/>
+                                            </p:txEl>
+                                          </p:spTgt>
+                                        </p:tgtEl>
+                                      </p:cBhvr>
+                                    </p:animEffect>
+                                  </p:childTnLst>
+                                </p:cTn>
+                              </p:par>
+                              <p:par>
+                                <p:cTn id="8" presetID="10" presetClass="entr" presetSubtype="0" fill="hold" nodeType="withEffect">
+                                  <p:stCondLst>
+                                    <p:cond delay="0"/>
+                                  </p:stCondLst>
+                                  <p:childTnLst>
+                                    <p:set>
+                                      <p:cBhvr>
+                                        <p:cTn id="9" dur="1" fill="hold">
+                                          <p:stCondLst>
+                                            <p:cond delay="0"/>
+                                          </p:stCondLst>
+                                        </p:cTn>
+                                        <p:tgtEl>
+                                          <p:spTgt spid="3">
+                                            <p:txEl>
+                                              <p:pRg st="4" end="4"/>
+                                            </p:txEl>
+                                          </p:spTgt>
+                                        </p:tgtEl>
+                                        <p:attrNameLst>
+                                          <p:attrName>style.visibility</p:attrName>
+                                        </p:attrNameLst>
+                                      </p:cBhvr>
+                                      <p:to>
+                                        <p:strVal val="visible"/>
+                                      </p:to>
+                                    </p:set>
+                                    <p:animEffect transition="in" filter="fade">
+                                      <p:cBhvr>
+                                        <p:cTn id="10" dur="500"/>
+                                        <p:tgtEl>
+                                          <p:spTgt spid="3">
+                                            <p:txEl>
+                                              <p:pRg st="4" end="4"/>
+                                            </p:txEl>
+                                          </p:spTgt>
+                                        </p:tgtEl>
+                                      </p:cBhvr>
+                                    </p:animEffect>
+                                  </p:childTnLst>
+                                </p:cTn>
+                              </p:par>
+                              <p:par>
+                                <p:cTn id="11" presetID="10" presetClass="entr" presetSubtype="0" fill="hold" nodeType="withEffect">
+                                  <p:stCondLst>
+                                    <p:cond delay="0"/>
+                                  </p:stCondLst>
+                                  <p:childTnLst>
+                                    <p:set>
+                                      <p:cBhvr>
+                                        <p:cTn id="12" dur="1" fill="hold">
+                                          <p:stCondLst>
+                                            <p:cond delay="0"/>
+                                          </p:stCondLst>
+                                        </p:cTn>
+                                        <p:tgtEl>
+                                          <p:spTgt spid="3">
+                                            <p:txEl>
+                                              <p:pRg st="5" end="5"/>
+                                            </p:txEl>
+                                          </p:spTgt>
+                                        </p:tgtEl>
+                                        <p:attrNameLst>
+                                          <p:attrName>style.visibility</p:attrName>
+                                        </p:attrNameLst>
+                                      </p:cBhvr>
+                                      <p:to>
+                                        <p:strVal val="visible"/>
+                                      </p:to>
+                                    </p:set>
+                                    <p:animEffect transition="in" filter="fade">
+                                      <p:cBhvr>
+                                        <p:cTn id="13" dur="500"/>
+                                        <p:tgtEl>
+                                          <p:spTgt spid="3">
+                                            <p:txEl>
+                                              <p:pRg st="5" end="5"/>
+                                            </p:txEl>
+                                          </p:spTgt>
+                                        </p:tgtEl>
+                                      </p:cBhvr>
+                                    </p:animEffect>
+                                  </p:childTnLst>
+                                </p:cTn>
+                              </p:par>
+                            </p:childTnLst>
+                          </p:cTn>
+                        </p:par>
+                      </p:childTnLst>
+                    </p:cTn>
+                  </p:par>
+                  <p:par>
+                    <p:cTn id="14" fill="hold">
+                      <p:stCondLst>
+                        <p:cond delay="indefinite"/>
+                      </p:stCondLst>
+                      <p:childTnLst>
+                        <p:par>
+                          <p:cTn id="15" fill="hold">
+                            <p:stCondLst>
+                              <p:cond delay="0"/>
+                            </p:stCondLst>
+                            <p:childTnLst>
+                              <p:par>
+                                <p:cTn id="16" presetID="10" presetClass="entr" presetSubtype="0" fill="hold" nodeType="clickEffect">
+                                  <p:stCondLst>
+                                    <p:cond delay="0"/>
+                                  </p:stCondLst>
+                                  <p:childTnLst>
+                                    <p:set>
+                                      <p:cBhvr>
+                                        <p:cTn id="17" dur="1" fill="hold">
+                                          <p:stCondLst>
+                                            <p:cond delay="0"/>
+                                          </p:stCondLst>
+                                        </p:cTn>
+                                        <p:tgtEl>
+                                          <p:spTgt spid="3">
+                                            <p:txEl>
+                                              <p:pRg st="6" end="6"/>
+                                            </p:txEl>
+                                          </p:spTgt>
+                                        </p:tgtEl>
+                                        <p:attrNameLst>
+                                          <p:attrName>style.visibility</p:attrName>
+                                        </p:attrNameLst>
+                                      </p:cBhvr>
+                                      <p:to>
+                                        <p:strVal val="visible"/>
+                                      </p:to>
+                                    </p:set>
+                                    <p:animEffect transition="in" filter="fade">
+                                      <p:cBhvr>
+                                        <p:cTn id="18" dur="500"/>
+                                        <p:tgtEl>
+                                          <p:spTgt spid="3">
+                                            <p:txEl>
+                                              <p:pRg st="6" end="6"/>
+                                            </p:txEl>
+                                          </p:spTgt>
+                                        </p:tgtEl>
+                                      </p:cBhvr>
+                                    </p:animEffect>
+                                  </p:childTnLst>
+                                </p:cTn>
+                              </p:par>
+                              <p:par>
+                                <p:cTn id="19" presetID="10" presetClass="entr" presetSubtype="0" fill="hold" nodeType="withEffect">
+                                  <p:stCondLst>
+                                    <p:cond delay="0"/>
+                                  </p:stCondLst>
+                                  <p:childTnLst>
+                                    <p:set>
+                                      <p:cBhvr>
+                                        <p:cTn id="20" dur="1" fill="hold">
+                                          <p:stCondLst>
+                                            <p:cond delay="0"/>
+                                          </p:stCondLst>
+                                        </p:cTn>
+                                        <p:tgtEl>
+                                          <p:spTgt spid="3">
+                                            <p:txEl>
+                                              <p:pRg st="7" end="7"/>
+                                            </p:txEl>
+                                          </p:spTgt>
+                                        </p:tgtEl>
+                                        <p:attrNameLst>
+                                          <p:attrName>style.visibility</p:attrName>
+                                        </p:attrNameLst>
+                                      </p:cBhvr>
+                                      <p:to>
+                                        <p:strVal val="visible"/>
+                                      </p:to>
+                                    </p:set>
+                                    <p:animEffect transition="in" filter="fade">
+                                      <p:cBhvr>
+                                        <p:cTn id="21" dur="500"/>
+                                        <p:tgtEl>
+                                          <p:spTgt spid="3">
+                                            <p:txEl>
+                                              <p:pRg st="7" end="7"/>
+                                            </p:txEl>
+                                          </p:spTgt>
+                                        </p:tgtEl>
+                                      </p:cBhvr>
+                                    </p:animEffect>
+                                  </p:childTnLst>
+                                </p:cTn>
+                              </p:par>
+                            </p:childTnLst>
+                          </p:cTn>
+                        </p:par>
+                      </p:childTnLst>
+                    </p:cTn>
+                  </p:par>
+                </p:childTnLst>
+              </p:cTn>
+              <p:prevCondLst>
+                <p:cond evt="onPrev" delay="0">
+                  <p:tgtEl>
+                    <p:sldTgt/>
+                  </p:tgtEl>
+                </p:cond>
+              </p:prevCondLst>
+              <p:nextCondLst>
+                <p:cond evt="onNext" delay="0">
+                  <p:tgtEl>
+                    <p:sldTgt/>
+                  </p:tgtEl>
+                </p:cond>
+              </p:nextCondLst>
+            </p:seq>
+          </p:childTnLst>
+        </p:cTn>
+      </p:par>
+    </p:tnLst>
+  </p:timing>
 </p:sld>
 </file>
 
@@ -5945,6 +6226,416 @@
   <p:clrMapOvr>
     <a:masterClrMapping/>
   </p:clrMapOvr>
+  <p:timing>
+    <p:tnLst>
+      <p:par>
+        <p:cTn id="1" dur="indefinite" restart="never" nodeType="tmRoot">
+          <p:childTnLst>
+            <p:seq concurrent="1" nextAc="seek">
+              <p:cTn id="2" dur="indefinite" nodeType="mainSeq">
+                <p:childTnLst>
+                  <p:par>
+                    <p:cTn id="3" fill="hold">
+                      <p:stCondLst>
+                        <p:cond delay="indefinite"/>
+                      </p:stCondLst>
+                      <p:childTnLst>
+                        <p:par>
+                          <p:cTn id="4" fill="hold">
+                            <p:stCondLst>
+                              <p:cond delay="0"/>
+                            </p:stCondLst>
+                            <p:childTnLst>
+                              <p:par>
+                                <p:cTn id="5" presetID="10" presetClass="entr" presetSubtype="0" fill="hold" nodeType="clickEffect">
+                                  <p:stCondLst>
+                                    <p:cond delay="0"/>
+                                  </p:stCondLst>
+                                  <p:childTnLst>
+                                    <p:set>
+                                      <p:cBhvr>
+                                        <p:cTn id="6" dur="1" fill="hold">
+                                          <p:stCondLst>
+                                            <p:cond delay="0"/>
+                                          </p:stCondLst>
+                                        </p:cTn>
+                                        <p:tgtEl>
+                                          <p:spTgt spid="3">
+                                            <p:txEl>
+                                              <p:pRg st="2" end="2"/>
+                                            </p:txEl>
+                                          </p:spTgt>
+                                        </p:tgtEl>
+                                        <p:attrNameLst>
+                                          <p:attrName>style.visibility</p:attrName>
+                                        </p:attrNameLst>
+                                      </p:cBhvr>
+                                      <p:to>
+                                        <p:strVal val="visible"/>
+                                      </p:to>
+                                    </p:set>
+                                    <p:animEffect transition="in" filter="fade">
+                                      <p:cBhvr>
+                                        <p:cTn id="7" dur="500"/>
+                                        <p:tgtEl>
+                                          <p:spTgt spid="3">
+                                            <p:txEl>
+                                              <p:pRg st="2" end="2"/>
+                                            </p:txEl>
+                                          </p:spTgt>
+                                        </p:tgtEl>
+                                      </p:cBhvr>
+                                    </p:animEffect>
+                                  </p:childTnLst>
+                                </p:cTn>
+                              </p:par>
+                              <p:par>
+                                <p:cTn id="8" presetID="10" presetClass="entr" presetSubtype="0" fill="hold" nodeType="withEffect">
+                                  <p:stCondLst>
+                                    <p:cond delay="0"/>
+                                  </p:stCondLst>
+                                  <p:childTnLst>
+                                    <p:set>
+                                      <p:cBhvr>
+                                        <p:cTn id="9" dur="1" fill="hold">
+                                          <p:stCondLst>
+                                            <p:cond delay="0"/>
+                                          </p:stCondLst>
+                                        </p:cTn>
+                                        <p:tgtEl>
+                                          <p:spTgt spid="3">
+                                            <p:txEl>
+                                              <p:pRg st="3" end="3"/>
+                                            </p:txEl>
+                                          </p:spTgt>
+                                        </p:tgtEl>
+                                        <p:attrNameLst>
+                                          <p:attrName>style.visibility</p:attrName>
+                                        </p:attrNameLst>
+                                      </p:cBhvr>
+                                      <p:to>
+                                        <p:strVal val="visible"/>
+                                      </p:to>
+                                    </p:set>
+                                    <p:animEffect transition="in" filter="fade">
+                                      <p:cBhvr>
+                                        <p:cTn id="10" dur="500"/>
+                                        <p:tgtEl>
+                                          <p:spTgt spid="3">
+                                            <p:txEl>
+                                              <p:pRg st="3" end="3"/>
+                                            </p:txEl>
+                                          </p:spTgt>
+                                        </p:tgtEl>
+                                      </p:cBhvr>
+                                    </p:animEffect>
+                                  </p:childTnLst>
+                                </p:cTn>
+                              </p:par>
+                              <p:par>
+                                <p:cTn id="11" presetID="10" presetClass="entr" presetSubtype="0" fill="hold" nodeType="withEffect">
+                                  <p:stCondLst>
+                                    <p:cond delay="0"/>
+                                  </p:stCondLst>
+                                  <p:childTnLst>
+                                    <p:set>
+                                      <p:cBhvr>
+                                        <p:cTn id="12" dur="1" fill="hold">
+                                          <p:stCondLst>
+                                            <p:cond delay="0"/>
+                                          </p:stCondLst>
+                                        </p:cTn>
+                                        <p:tgtEl>
+                                          <p:spTgt spid="3">
+                                            <p:txEl>
+                                              <p:pRg st="4" end="4"/>
+                                            </p:txEl>
+                                          </p:spTgt>
+                                        </p:tgtEl>
+                                        <p:attrNameLst>
+                                          <p:attrName>style.visibility</p:attrName>
+                                        </p:attrNameLst>
+                                      </p:cBhvr>
+                                      <p:to>
+                                        <p:strVal val="visible"/>
+                                      </p:to>
+                                    </p:set>
+                                    <p:animEffect transition="in" filter="fade">
+                                      <p:cBhvr>
+                                        <p:cTn id="13" dur="500"/>
+                                        <p:tgtEl>
+                                          <p:spTgt spid="3">
+                                            <p:txEl>
+                                              <p:pRg st="4" end="4"/>
+                                            </p:txEl>
+                                          </p:spTgt>
+                                        </p:tgtEl>
+                                      </p:cBhvr>
+                                    </p:animEffect>
+                                  </p:childTnLst>
+                                </p:cTn>
+                              </p:par>
+                              <p:par>
+                                <p:cTn id="14" presetID="10" presetClass="entr" presetSubtype="0" fill="hold" nodeType="withEffect">
+                                  <p:stCondLst>
+                                    <p:cond delay="0"/>
+                                  </p:stCondLst>
+                                  <p:childTnLst>
+                                    <p:set>
+                                      <p:cBhvr>
+                                        <p:cTn id="15" dur="1" fill="hold">
+                                          <p:stCondLst>
+                                            <p:cond delay="0"/>
+                                          </p:stCondLst>
+                                        </p:cTn>
+                                        <p:tgtEl>
+                                          <p:spTgt spid="3">
+                                            <p:txEl>
+                                              <p:pRg st="5" end="5"/>
+                                            </p:txEl>
+                                          </p:spTgt>
+                                        </p:tgtEl>
+                                        <p:attrNameLst>
+                                          <p:attrName>style.visibility</p:attrName>
+                                        </p:attrNameLst>
+                                      </p:cBhvr>
+                                      <p:to>
+                                        <p:strVal val="visible"/>
+                                      </p:to>
+                                    </p:set>
+                                    <p:animEffect transition="in" filter="fade">
+                                      <p:cBhvr>
+                                        <p:cTn id="16" dur="500"/>
+                                        <p:tgtEl>
+                                          <p:spTgt spid="3">
+                                            <p:txEl>
+                                              <p:pRg st="5" end="5"/>
+                                            </p:txEl>
+                                          </p:spTgt>
+                                        </p:tgtEl>
+                                      </p:cBhvr>
+                                    </p:animEffect>
+                                  </p:childTnLst>
+                                </p:cTn>
+                              </p:par>
+                            </p:childTnLst>
+                          </p:cTn>
+                        </p:par>
+                      </p:childTnLst>
+                    </p:cTn>
+                  </p:par>
+                  <p:par>
+                    <p:cTn id="17" fill="hold">
+                      <p:stCondLst>
+                        <p:cond delay="indefinite"/>
+                      </p:stCondLst>
+                      <p:childTnLst>
+                        <p:par>
+                          <p:cTn id="18" fill="hold">
+                            <p:stCondLst>
+                              <p:cond delay="0"/>
+                            </p:stCondLst>
+                            <p:childTnLst>
+                              <p:par>
+                                <p:cTn id="19" presetID="10" presetClass="entr" presetSubtype="0" fill="hold" nodeType="clickEffect">
+                                  <p:stCondLst>
+                                    <p:cond delay="0"/>
+                                  </p:stCondLst>
+                                  <p:childTnLst>
+                                    <p:set>
+                                      <p:cBhvr>
+                                        <p:cTn id="20" dur="1" fill="hold">
+                                          <p:stCondLst>
+                                            <p:cond delay="0"/>
+                                          </p:stCondLst>
+                                        </p:cTn>
+                                        <p:tgtEl>
+                                          <p:spTgt spid="3">
+                                            <p:txEl>
+                                              <p:pRg st="6" end="6"/>
+                                            </p:txEl>
+                                          </p:spTgt>
+                                        </p:tgtEl>
+                                        <p:attrNameLst>
+                                          <p:attrName>style.visibility</p:attrName>
+                                        </p:attrNameLst>
+                                      </p:cBhvr>
+                                      <p:to>
+                                        <p:strVal val="visible"/>
+                                      </p:to>
+                                    </p:set>
+                                    <p:animEffect transition="in" filter="fade">
+                                      <p:cBhvr>
+                                        <p:cTn id="21" dur="500"/>
+                                        <p:tgtEl>
+                                          <p:spTgt spid="3">
+                                            <p:txEl>
+                                              <p:pRg st="6" end="6"/>
+                                            </p:txEl>
+                                          </p:spTgt>
+                                        </p:tgtEl>
+                                      </p:cBhvr>
+                                    </p:animEffect>
+                                  </p:childTnLst>
+                                </p:cTn>
+                              </p:par>
+                              <p:par>
+                                <p:cTn id="22" presetID="10" presetClass="entr" presetSubtype="0" fill="hold" nodeType="withEffect">
+                                  <p:stCondLst>
+                                    <p:cond delay="0"/>
+                                  </p:stCondLst>
+                                  <p:childTnLst>
+                                    <p:set>
+                                      <p:cBhvr>
+                                        <p:cTn id="23" dur="1" fill="hold">
+                                          <p:stCondLst>
+                                            <p:cond delay="0"/>
+                                          </p:stCondLst>
+                                        </p:cTn>
+                                        <p:tgtEl>
+                                          <p:spTgt spid="3">
+                                            <p:txEl>
+                                              <p:pRg st="7" end="7"/>
+                                            </p:txEl>
+                                          </p:spTgt>
+                                        </p:tgtEl>
+                                        <p:attrNameLst>
+                                          <p:attrName>style.visibility</p:attrName>
+                                        </p:attrNameLst>
+                                      </p:cBhvr>
+                                      <p:to>
+                                        <p:strVal val="visible"/>
+                                      </p:to>
+                                    </p:set>
+                                    <p:animEffect transition="in" filter="fade">
+                                      <p:cBhvr>
+                                        <p:cTn id="24" dur="500"/>
+                                        <p:tgtEl>
+                                          <p:spTgt spid="3">
+                                            <p:txEl>
+                                              <p:pRg st="7" end="7"/>
+                                            </p:txEl>
+                                          </p:spTgt>
+                                        </p:tgtEl>
+                                      </p:cBhvr>
+                                    </p:animEffect>
+                                  </p:childTnLst>
+                                </p:cTn>
+                              </p:par>
+                              <p:par>
+                                <p:cTn id="25" presetID="10" presetClass="entr" presetSubtype="0" fill="hold" nodeType="withEffect">
+                                  <p:stCondLst>
+                                    <p:cond delay="0"/>
+                                  </p:stCondLst>
+                                  <p:childTnLst>
+                                    <p:set>
+                                      <p:cBhvr>
+                                        <p:cTn id="26" dur="1" fill="hold">
+                                          <p:stCondLst>
+                                            <p:cond delay="0"/>
+                                          </p:stCondLst>
+                                        </p:cTn>
+                                        <p:tgtEl>
+                                          <p:spTgt spid="3">
+                                            <p:txEl>
+                                              <p:pRg st="8" end="8"/>
+                                            </p:txEl>
+                                          </p:spTgt>
+                                        </p:tgtEl>
+                                        <p:attrNameLst>
+                                          <p:attrName>style.visibility</p:attrName>
+                                        </p:attrNameLst>
+                                      </p:cBhvr>
+                                      <p:to>
+                                        <p:strVal val="visible"/>
+                                      </p:to>
+                                    </p:set>
+                                    <p:animEffect transition="in" filter="fade">
+                                      <p:cBhvr>
+                                        <p:cTn id="27" dur="500"/>
+                                        <p:tgtEl>
+                                          <p:spTgt spid="3">
+                                            <p:txEl>
+                                              <p:pRg st="8" end="8"/>
+                                            </p:txEl>
+                                          </p:spTgt>
+                                        </p:tgtEl>
+                                      </p:cBhvr>
+                                    </p:animEffect>
+                                  </p:childTnLst>
+                                </p:cTn>
+                              </p:par>
+                              <p:par>
+                                <p:cTn id="28" presetID="10" presetClass="entr" presetSubtype="0" fill="hold" nodeType="withEffect">
+                                  <p:stCondLst>
+                                    <p:cond delay="0"/>
+                                  </p:stCondLst>
+                                  <p:childTnLst>
+                                    <p:set>
+                                      <p:cBhvr>
+                                        <p:cTn id="29" dur="1" fill="hold">
+                                          <p:stCondLst>
+                                            <p:cond delay="0"/>
+                                          </p:stCondLst>
+                                        </p:cTn>
+                                        <p:tgtEl>
+                                          <p:spTgt spid="3">
+                                            <p:txEl>
+                                              <p:pRg st="9" end="9"/>
+                                            </p:txEl>
+                                          </p:spTgt>
+                                        </p:tgtEl>
+                                        <p:attrNameLst>
+                                          <p:attrName>style.visibility</p:attrName>
+                                        </p:attrNameLst>
+                                      </p:cBhvr>
+                                      <p:to>
+                                        <p:strVal val="visible"/>
+                                      </p:to>
+                                    </p:set>
+                                    <p:animEffect transition="in" filter="fade">
+                                      <p:cBhvr>
+                                        <p:cTn id="30" dur="500"/>
+                                        <p:tgtEl>
+                                          <p:spTgt spid="3">
+                                            <p:txEl>
+                                              <p:pRg st="9" end="9"/>
+                                            </p:txEl>
+                                          </p:spTgt>
+                                        </p:tgtEl>
+                                      </p:cBhvr>
+                                    </p:animEffect>
+                                  </p:childTnLst>
+                                </p:cTn>
+                              </p:par>
+                            </p:childTnLst>
+                          </p:cTn>
+                        </p:par>
+                      </p:childTnLst>
+                    </p:cTn>
+                  </p:par>
+                </p:childTnLst>
+              </p:cTn>
+              <p:prevCondLst>
+                <p:cond evt="onPrev" delay="0">
+                  <p:tgtEl>
+                    <p:sldTgt/>
+                  </p:tgtEl>
+                </p:cond>
+              </p:prevCondLst>
+              <p:nextCondLst>
+                <p:cond evt="onNext" delay="0">
+                  <p:tgtEl>
+                    <p:sldTgt/>
+                  </p:tgtEl>
+                </p:cond>
+              </p:nextCondLst>
+            </p:seq>
+          </p:childTnLst>
+        </p:cTn>
+      </p:par>
+    </p:tnLst>
+  </p:timing>
 </p:sld>
 </file>
 
@@ -7521,6 +8212,183 @@
   <p:clrMapOvr>
     <a:masterClrMapping/>
   </p:clrMapOvr>
+  <p:timing>
+    <p:tnLst>
+      <p:par>
+        <p:cTn id="1" dur="indefinite" restart="never" nodeType="tmRoot">
+          <p:childTnLst>
+            <p:seq concurrent="1" nextAc="seek">
+              <p:cTn id="2" dur="indefinite" nodeType="mainSeq">
+                <p:childTnLst>
+                  <p:par>
+                    <p:cTn id="3" fill="hold">
+                      <p:stCondLst>
+                        <p:cond delay="indefinite"/>
+                      </p:stCondLst>
+                      <p:childTnLst>
+                        <p:par>
+                          <p:cTn id="4" fill="hold">
+                            <p:stCondLst>
+                              <p:cond delay="0"/>
+                            </p:stCondLst>
+                            <p:childTnLst>
+                              <p:par>
+                                <p:cTn id="5" presetID="10" presetClass="entr" presetSubtype="0" fill="hold" nodeType="clickEffect">
+                                  <p:stCondLst>
+                                    <p:cond delay="0"/>
+                                  </p:stCondLst>
+                                  <p:childTnLst>
+                                    <p:set>
+                                      <p:cBhvr>
+                                        <p:cTn id="6" dur="1" fill="hold">
+                                          <p:stCondLst>
+                                            <p:cond delay="0"/>
+                                          </p:stCondLst>
+                                        </p:cTn>
+                                        <p:tgtEl>
+                                          <p:spTgt spid="3">
+                                            <p:txEl>
+                                              <p:pRg st="2" end="2"/>
+                                            </p:txEl>
+                                          </p:spTgt>
+                                        </p:tgtEl>
+                                        <p:attrNameLst>
+                                          <p:attrName>style.visibility</p:attrName>
+                                        </p:attrNameLst>
+                                      </p:cBhvr>
+                                      <p:to>
+                                        <p:strVal val="visible"/>
+                                      </p:to>
+                                    </p:set>
+                                    <p:animEffect transition="in" filter="fade">
+                                      <p:cBhvr>
+                                        <p:cTn id="7" dur="500"/>
+                                        <p:tgtEl>
+                                          <p:spTgt spid="3">
+                                            <p:txEl>
+                                              <p:pRg st="2" end="2"/>
+                                            </p:txEl>
+                                          </p:spTgt>
+                                        </p:tgtEl>
+                                      </p:cBhvr>
+                                    </p:animEffect>
+                                  </p:childTnLst>
+                                </p:cTn>
+                              </p:par>
+                              <p:par>
+                                <p:cTn id="8" presetID="10" presetClass="entr" presetSubtype="0" fill="hold" nodeType="withEffect">
+                                  <p:stCondLst>
+                                    <p:cond delay="0"/>
+                                  </p:stCondLst>
+                                  <p:childTnLst>
+                                    <p:set>
+                                      <p:cBhvr>
+                                        <p:cTn id="9" dur="1" fill="hold">
+                                          <p:stCondLst>
+                                            <p:cond delay="0"/>
+                                          </p:stCondLst>
+                                        </p:cTn>
+                                        <p:tgtEl>
+                                          <p:spTgt spid="3">
+                                            <p:txEl>
+                                              <p:pRg st="4" end="4"/>
+                                            </p:txEl>
+                                          </p:spTgt>
+                                        </p:tgtEl>
+                                        <p:attrNameLst>
+                                          <p:attrName>style.visibility</p:attrName>
+                                        </p:attrNameLst>
+                                      </p:cBhvr>
+                                      <p:to>
+                                        <p:strVal val="visible"/>
+                                      </p:to>
+                                    </p:set>
+                                    <p:animEffect transition="in" filter="fade">
+                                      <p:cBhvr>
+                                        <p:cTn id="10" dur="500"/>
+                                        <p:tgtEl>
+                                          <p:spTgt spid="3">
+                                            <p:txEl>
+                                              <p:pRg st="4" end="4"/>
+                                            </p:txEl>
+                                          </p:spTgt>
+                                        </p:tgtEl>
+                                      </p:cBhvr>
+                                    </p:animEffect>
+                                  </p:childTnLst>
+                                </p:cTn>
+                              </p:par>
+                              <p:par>
+                                <p:cTn id="11" presetID="10" presetClass="entr" presetSubtype="0" fill="hold" nodeType="withEffect">
+                                  <p:stCondLst>
+                                    <p:cond delay="0"/>
+                                  </p:stCondLst>
+                                  <p:childTnLst>
+                                    <p:set>
+                                      <p:cBhvr>
+                                        <p:cTn id="12" dur="1" fill="hold">
+                                          <p:stCondLst>
+                                            <p:cond delay="0"/>
+                                          </p:stCondLst>
+                                        </p:cTn>
+                                        <p:tgtEl>
+                                          <p:spTgt spid="3">
+                                            <p:txEl>
+                                              <p:pRg st="5" end="5"/>
+                                            </p:txEl>
+                                          </p:spTgt>
+                                        </p:tgtEl>
+                                        <p:attrNameLst>
+                                          <p:attrName>style.visibility</p:attrName>
+                                        </p:attrNameLst>
+                                      </p:cBhvr>
+                                      <p:to>
+                                        <p:strVal val="visible"/>
+                                      </p:to>
+                                    </p:set>
+                                    <p:animEffect transition="in" filter="fade">
+                                      <p:cBhvr>
+                                        <p:cTn id="13" dur="500"/>
+                                        <p:tgtEl>
+                                          <p:spTgt spid="3">
+                                            <p:txEl>
+                                              <p:pRg st="5" end="5"/>
+                                            </p:txEl>
+                                          </p:spTgt>
+                                        </p:tgtEl>
+                                      </p:cBhvr>
+                                    </p:animEffect>
+                                  </p:childTnLst>
+                                </p:cTn>
+                              </p:par>
+                            </p:childTnLst>
+                          </p:cTn>
+                        </p:par>
+                      </p:childTnLst>
+                    </p:cTn>
+                  </p:par>
+                </p:childTnLst>
+              </p:cTn>
+              <p:prevCondLst>
+                <p:cond evt="onPrev" delay="0">
+                  <p:tgtEl>
+                    <p:sldTgt/>
+                  </p:tgtEl>
+                </p:cond>
+              </p:prevCondLst>
+              <p:nextCondLst>
+                <p:cond evt="onNext" delay="0">
+                  <p:tgtEl>
+                    <p:sldTgt/>
+                  </p:tgtEl>
+                </p:cond>
+              </p:nextCondLst>
+            </p:seq>
+          </p:childTnLst>
+        </p:cTn>
+      </p:par>
+    </p:tnLst>
+  </p:timing>
 </p:sld>
 </file>
 
@@ -7569,8 +8437,8 @@
           </a:p>
         </p:txBody>
       </p:sp>
-      <mc:AlternateContent xmlns:mc="http://schemas.openxmlformats.org/markup-compatibility/2006" xmlns:a14="http://schemas.microsoft.com/office/drawing/2010/main">
-        <mc:Choice Requires="a14">
+      <mc:AlternateContent xmlns:mc="http://schemas.openxmlformats.org/markup-compatibility/2006">
+        <mc:Choice xmlns:a14="http://schemas.microsoft.com/office/drawing/2010/main" Requires="a14">
           <p:sp>
             <p:nvSpPr>
               <p:cNvPr id="3" name="Content Placeholder 2">
@@ -7601,12 +8469,6 @@
               <a:p>
                 <a:r>
                   <a:rPr lang="en-US" dirty="0"/>
-                  <a:t>Drop sub-carrier index (since we are looking at one RE)</a:t>
-                </a:r>
-              </a:p>
-              <a:p>
-                <a:r>
-                  <a:rPr lang="en-US" dirty="0"/>
                   <a:t>Channel:  </a:t>
                 </a:r>
                 <a14:m>
@@ -7786,6 +8648,14 @@
                     </m:sSub>
                   </m:oMath>
                 </a14:m>
+                <a:endParaRPr lang="en-US" b="0" i="1" dirty="0"/>
+              </a:p>
+              <a:p>
+                <a:pPr lvl="1"/>
+                <a:r>
+                  <a:rPr lang="en-US" dirty="0"/>
+                  <a:t>Drop sub-carrier index (since we are looking at one RE)</a:t>
+                </a:r>
                 <a:endParaRPr lang="en-US" b="0" i="1" dirty="0"/>
               </a:p>
               <a:p>
@@ -8525,7 +9395,7 @@
             </p:txBody>
           </p:sp>
         </mc:Choice>
-        <mc:Fallback xmlns="">
+        <mc:Fallback>
           <p:sp>
             <p:nvSpPr>
               <p:cNvPr id="3" name="Content Placeholder 2">
@@ -8608,6 +9478,412 @@
   <p:clrMapOvr>
     <a:masterClrMapping/>
   </p:clrMapOvr>
+  <p:timing>
+    <p:tnLst>
+      <p:par>
+        <p:cTn id="1" dur="indefinite" restart="never" nodeType="tmRoot">
+          <p:childTnLst>
+            <p:seq concurrent="1" nextAc="seek">
+              <p:cTn id="2" dur="indefinite" nodeType="mainSeq">
+                <p:childTnLst>
+                  <p:par>
+                    <p:cTn id="3" fill="hold">
+                      <p:stCondLst>
+                        <p:cond delay="indefinite"/>
+                        <p:cond evt="onBegin" delay="0">
+                          <p:tn val="2"/>
+                        </p:cond>
+                      </p:stCondLst>
+                      <p:childTnLst>
+                        <p:par>
+                          <p:cTn id="4" fill="hold">
+                            <p:stCondLst>
+                              <p:cond delay="0"/>
+                            </p:stCondLst>
+                            <p:childTnLst>
+                              <p:par>
+                                <p:cTn id="5" presetID="10" presetClass="entr" presetSubtype="0" fill="hold" nodeType="withEffect">
+                                  <p:stCondLst>
+                                    <p:cond delay="0"/>
+                                  </p:stCondLst>
+                                  <p:childTnLst>
+                                    <p:set>
+                                      <p:cBhvr>
+                                        <p:cTn id="6" dur="1" fill="hold">
+                                          <p:stCondLst>
+                                            <p:cond delay="0"/>
+                                          </p:stCondLst>
+                                        </p:cTn>
+                                        <p:tgtEl>
+                                          <p:spTgt spid="3">
+                                            <p:txEl>
+                                              <p:pRg st="0" end="0"/>
+                                            </p:txEl>
+                                          </p:spTgt>
+                                        </p:tgtEl>
+                                        <p:attrNameLst>
+                                          <p:attrName>style.visibility</p:attrName>
+                                        </p:attrNameLst>
+                                      </p:cBhvr>
+                                      <p:to>
+                                        <p:strVal val="visible"/>
+                                      </p:to>
+                                    </p:set>
+                                    <p:animEffect transition="in" filter="fade">
+                                      <p:cBhvr>
+                                        <p:cTn id="7" dur="500"/>
+                                        <p:tgtEl>
+                                          <p:spTgt spid="3">
+                                            <p:txEl>
+                                              <p:pRg st="0" end="0"/>
+                                            </p:txEl>
+                                          </p:spTgt>
+                                        </p:tgtEl>
+                                      </p:cBhvr>
+                                    </p:animEffect>
+                                  </p:childTnLst>
+                                </p:cTn>
+                              </p:par>
+                              <p:par>
+                                <p:cTn id="8" presetID="10" presetClass="entr" presetSubtype="0" fill="hold" nodeType="withEffect">
+                                  <p:stCondLst>
+                                    <p:cond delay="0"/>
+                                  </p:stCondLst>
+                                  <p:childTnLst>
+                                    <p:set>
+                                      <p:cBhvr>
+                                        <p:cTn id="9" dur="1" fill="hold">
+                                          <p:stCondLst>
+                                            <p:cond delay="0"/>
+                                          </p:stCondLst>
+                                        </p:cTn>
+                                        <p:tgtEl>
+                                          <p:spTgt spid="3">
+                                            <p:txEl>
+                                              <p:pRg st="1" end="1"/>
+                                            </p:txEl>
+                                          </p:spTgt>
+                                        </p:tgtEl>
+                                        <p:attrNameLst>
+                                          <p:attrName>style.visibility</p:attrName>
+                                        </p:attrNameLst>
+                                      </p:cBhvr>
+                                      <p:to>
+                                        <p:strVal val="visible"/>
+                                      </p:to>
+                                    </p:set>
+                                    <p:animEffect transition="in" filter="fade">
+                                      <p:cBhvr>
+                                        <p:cTn id="10" dur="500"/>
+                                        <p:tgtEl>
+                                          <p:spTgt spid="3">
+                                            <p:txEl>
+                                              <p:pRg st="1" end="1"/>
+                                            </p:txEl>
+                                          </p:spTgt>
+                                        </p:tgtEl>
+                                      </p:cBhvr>
+                                    </p:animEffect>
+                                  </p:childTnLst>
+                                </p:cTn>
+                              </p:par>
+                            </p:childTnLst>
+                          </p:cTn>
+                        </p:par>
+                      </p:childTnLst>
+                    </p:cTn>
+                  </p:par>
+                  <p:par>
+                    <p:cTn id="11" fill="hold">
+                      <p:stCondLst>
+                        <p:cond delay="indefinite"/>
+                      </p:stCondLst>
+                      <p:childTnLst>
+                        <p:par>
+                          <p:cTn id="12" fill="hold">
+                            <p:stCondLst>
+                              <p:cond delay="0"/>
+                            </p:stCondLst>
+                            <p:childTnLst>
+                              <p:par>
+                                <p:cTn id="13" presetID="10" presetClass="entr" presetSubtype="0" fill="hold" nodeType="clickEffect">
+                                  <p:stCondLst>
+                                    <p:cond delay="0"/>
+                                  </p:stCondLst>
+                                  <p:childTnLst>
+                                    <p:set>
+                                      <p:cBhvr>
+                                        <p:cTn id="14" dur="1" fill="hold">
+                                          <p:stCondLst>
+                                            <p:cond delay="0"/>
+                                          </p:stCondLst>
+                                        </p:cTn>
+                                        <p:tgtEl>
+                                          <p:spTgt spid="3">
+                                            <p:txEl>
+                                              <p:pRg st="2" end="2"/>
+                                            </p:txEl>
+                                          </p:spTgt>
+                                        </p:tgtEl>
+                                        <p:attrNameLst>
+                                          <p:attrName>style.visibility</p:attrName>
+                                        </p:attrNameLst>
+                                      </p:cBhvr>
+                                      <p:to>
+                                        <p:strVal val="visible"/>
+                                      </p:to>
+                                    </p:set>
+                                    <p:animEffect transition="in" filter="fade">
+                                      <p:cBhvr>
+                                        <p:cTn id="15" dur="500"/>
+                                        <p:tgtEl>
+                                          <p:spTgt spid="3">
+                                            <p:txEl>
+                                              <p:pRg st="2" end="2"/>
+                                            </p:txEl>
+                                          </p:spTgt>
+                                        </p:tgtEl>
+                                      </p:cBhvr>
+                                    </p:animEffect>
+                                  </p:childTnLst>
+                                </p:cTn>
+                              </p:par>
+                            </p:childTnLst>
+                          </p:cTn>
+                        </p:par>
+                      </p:childTnLst>
+                    </p:cTn>
+                  </p:par>
+                  <p:par>
+                    <p:cTn id="16" fill="hold">
+                      <p:stCondLst>
+                        <p:cond delay="indefinite"/>
+                      </p:stCondLst>
+                      <p:childTnLst>
+                        <p:par>
+                          <p:cTn id="17" fill="hold">
+                            <p:stCondLst>
+                              <p:cond delay="0"/>
+                            </p:stCondLst>
+                            <p:childTnLst>
+                              <p:par>
+                                <p:cTn id="18" presetID="10" presetClass="entr" presetSubtype="0" fill="hold" nodeType="clickEffect">
+                                  <p:stCondLst>
+                                    <p:cond delay="0"/>
+                                  </p:stCondLst>
+                                  <p:childTnLst>
+                                    <p:set>
+                                      <p:cBhvr>
+                                        <p:cTn id="19" dur="1" fill="hold">
+                                          <p:stCondLst>
+                                            <p:cond delay="0"/>
+                                          </p:stCondLst>
+                                        </p:cTn>
+                                        <p:tgtEl>
+                                          <p:spTgt spid="3">
+                                            <p:txEl>
+                                              <p:pRg st="3" end="3"/>
+                                            </p:txEl>
+                                          </p:spTgt>
+                                        </p:tgtEl>
+                                        <p:attrNameLst>
+                                          <p:attrName>style.visibility</p:attrName>
+                                        </p:attrNameLst>
+                                      </p:cBhvr>
+                                      <p:to>
+                                        <p:strVal val="visible"/>
+                                      </p:to>
+                                    </p:set>
+                                    <p:animEffect transition="in" filter="fade">
+                                      <p:cBhvr>
+                                        <p:cTn id="20" dur="500"/>
+                                        <p:tgtEl>
+                                          <p:spTgt spid="3">
+                                            <p:txEl>
+                                              <p:pRg st="3" end="3"/>
+                                            </p:txEl>
+                                          </p:spTgt>
+                                        </p:tgtEl>
+                                      </p:cBhvr>
+                                    </p:animEffect>
+                                  </p:childTnLst>
+                                </p:cTn>
+                              </p:par>
+                              <p:par>
+                                <p:cTn id="21" presetID="10" presetClass="entr" presetSubtype="0" fill="hold" nodeType="withEffect">
+                                  <p:stCondLst>
+                                    <p:cond delay="0"/>
+                                  </p:stCondLst>
+                                  <p:childTnLst>
+                                    <p:set>
+                                      <p:cBhvr>
+                                        <p:cTn id="22" dur="1" fill="hold">
+                                          <p:stCondLst>
+                                            <p:cond delay="0"/>
+                                          </p:stCondLst>
+                                        </p:cTn>
+                                        <p:tgtEl>
+                                          <p:spTgt spid="3">
+                                            <p:txEl>
+                                              <p:pRg st="4" end="4"/>
+                                            </p:txEl>
+                                          </p:spTgt>
+                                        </p:tgtEl>
+                                        <p:attrNameLst>
+                                          <p:attrName>style.visibility</p:attrName>
+                                        </p:attrNameLst>
+                                      </p:cBhvr>
+                                      <p:to>
+                                        <p:strVal val="visible"/>
+                                      </p:to>
+                                    </p:set>
+                                    <p:animEffect transition="in" filter="fade">
+                                      <p:cBhvr>
+                                        <p:cTn id="23" dur="500"/>
+                                        <p:tgtEl>
+                                          <p:spTgt spid="3">
+                                            <p:txEl>
+                                              <p:pRg st="4" end="4"/>
+                                            </p:txEl>
+                                          </p:spTgt>
+                                        </p:tgtEl>
+                                      </p:cBhvr>
+                                    </p:animEffect>
+                                  </p:childTnLst>
+                                </p:cTn>
+                              </p:par>
+                              <p:par>
+                                <p:cTn id="24" presetID="10" presetClass="entr" presetSubtype="0" fill="hold" nodeType="withEffect">
+                                  <p:stCondLst>
+                                    <p:cond delay="0"/>
+                                  </p:stCondLst>
+                                  <p:childTnLst>
+                                    <p:set>
+                                      <p:cBhvr>
+                                        <p:cTn id="25" dur="1" fill="hold">
+                                          <p:stCondLst>
+                                            <p:cond delay="0"/>
+                                          </p:stCondLst>
+                                        </p:cTn>
+                                        <p:tgtEl>
+                                          <p:spTgt spid="3">
+                                            <p:txEl>
+                                              <p:pRg st="5" end="5"/>
+                                            </p:txEl>
+                                          </p:spTgt>
+                                        </p:tgtEl>
+                                        <p:attrNameLst>
+                                          <p:attrName>style.visibility</p:attrName>
+                                        </p:attrNameLst>
+                                      </p:cBhvr>
+                                      <p:to>
+                                        <p:strVal val="visible"/>
+                                      </p:to>
+                                    </p:set>
+                                    <p:animEffect transition="in" filter="fade">
+                                      <p:cBhvr>
+                                        <p:cTn id="26" dur="500"/>
+                                        <p:tgtEl>
+                                          <p:spTgt spid="3">
+                                            <p:txEl>
+                                              <p:pRg st="5" end="5"/>
+                                            </p:txEl>
+                                          </p:spTgt>
+                                        </p:tgtEl>
+                                      </p:cBhvr>
+                                    </p:animEffect>
+                                  </p:childTnLst>
+                                </p:cTn>
+                              </p:par>
+                            </p:childTnLst>
+                          </p:cTn>
+                        </p:par>
+                      </p:childTnLst>
+                    </p:cTn>
+                  </p:par>
+                  <p:par>
+                    <p:cTn id="27" fill="hold">
+                      <p:stCondLst>
+                        <p:cond delay="indefinite"/>
+                      </p:stCondLst>
+                      <p:childTnLst>
+                        <p:par>
+                          <p:cTn id="28" fill="hold">
+                            <p:stCondLst>
+                              <p:cond delay="0"/>
+                            </p:stCondLst>
+                            <p:childTnLst>
+                              <p:par>
+                                <p:cTn id="29" presetID="10" presetClass="entr" presetSubtype="0" fill="hold" nodeType="clickEffect">
+                                  <p:stCondLst>
+                                    <p:cond delay="0"/>
+                                  </p:stCondLst>
+                                  <p:childTnLst>
+                                    <p:set>
+                                      <p:cBhvr>
+                                        <p:cTn id="30" dur="1" fill="hold">
+                                          <p:stCondLst>
+                                            <p:cond delay="0"/>
+                                          </p:stCondLst>
+                                        </p:cTn>
+                                        <p:tgtEl>
+                                          <p:spTgt spid="3">
+                                            <p:txEl>
+                                              <p:pRg st="6" end="6"/>
+                                            </p:txEl>
+                                          </p:spTgt>
+                                        </p:tgtEl>
+                                        <p:attrNameLst>
+                                          <p:attrName>style.visibility</p:attrName>
+                                        </p:attrNameLst>
+                                      </p:cBhvr>
+                                      <p:to>
+                                        <p:strVal val="visible"/>
+                                      </p:to>
+                                    </p:set>
+                                    <p:animEffect transition="in" filter="fade">
+                                      <p:cBhvr>
+                                        <p:cTn id="31" dur="500"/>
+                                        <p:tgtEl>
+                                          <p:spTgt spid="3">
+                                            <p:txEl>
+                                              <p:pRg st="6" end="6"/>
+                                            </p:txEl>
+                                          </p:spTgt>
+                                        </p:tgtEl>
+                                      </p:cBhvr>
+                                    </p:animEffect>
+                                  </p:childTnLst>
+                                </p:cTn>
+                              </p:par>
+                            </p:childTnLst>
+                          </p:cTn>
+                        </p:par>
+                      </p:childTnLst>
+                    </p:cTn>
+                  </p:par>
+                </p:childTnLst>
+              </p:cTn>
+              <p:prevCondLst>
+                <p:cond evt="onPrev" delay="0">
+                  <p:tgtEl>
+                    <p:sldTgt/>
+                  </p:tgtEl>
+                </p:cond>
+              </p:prevCondLst>
+              <p:nextCondLst>
+                <p:cond evt="onNext" delay="0">
+                  <p:tgtEl>
+                    <p:sldTgt/>
+                  </p:tgtEl>
+                </p:cond>
+              </p:nextCondLst>
+            </p:seq>
+          </p:childTnLst>
+        </p:cTn>
+      </p:par>
+    </p:tnLst>
+  </p:timing>
 </p:sld>
 </file>
 
@@ -8861,6 +10137,434 @@
   <p:clrMapOvr>
     <a:masterClrMapping/>
   </p:clrMapOvr>
+  <p:timing>
+    <p:tnLst>
+      <p:par>
+        <p:cTn id="1" dur="indefinite" restart="never" nodeType="tmRoot">
+          <p:childTnLst>
+            <p:seq concurrent="1" nextAc="seek">
+              <p:cTn id="2" dur="indefinite" nodeType="mainSeq">
+                <p:childTnLst>
+                  <p:par>
+                    <p:cTn id="3" fill="hold">
+                      <p:stCondLst>
+                        <p:cond delay="indefinite"/>
+                      </p:stCondLst>
+                      <p:childTnLst>
+                        <p:par>
+                          <p:cTn id="4" fill="hold">
+                            <p:stCondLst>
+                              <p:cond delay="0"/>
+                            </p:stCondLst>
+                            <p:childTnLst>
+                              <p:par>
+                                <p:cTn id="5" presetID="10" presetClass="entr" presetSubtype="0" fill="hold" nodeType="clickEffect">
+                                  <p:stCondLst>
+                                    <p:cond delay="0"/>
+                                  </p:stCondLst>
+                                  <p:childTnLst>
+                                    <p:set>
+                                      <p:cBhvr>
+                                        <p:cTn id="6" dur="1" fill="hold">
+                                          <p:stCondLst>
+                                            <p:cond delay="0"/>
+                                          </p:stCondLst>
+                                        </p:cTn>
+                                        <p:tgtEl>
+                                          <p:spTgt spid="3">
+                                            <p:txEl>
+                                              <p:pRg st="3" end="3"/>
+                                            </p:txEl>
+                                          </p:spTgt>
+                                        </p:tgtEl>
+                                        <p:attrNameLst>
+                                          <p:attrName>style.visibility</p:attrName>
+                                        </p:attrNameLst>
+                                      </p:cBhvr>
+                                      <p:to>
+                                        <p:strVal val="visible"/>
+                                      </p:to>
+                                    </p:set>
+                                    <p:animEffect transition="in" filter="fade">
+                                      <p:cBhvr>
+                                        <p:cTn id="7" dur="500"/>
+                                        <p:tgtEl>
+                                          <p:spTgt spid="3">
+                                            <p:txEl>
+                                              <p:pRg st="3" end="3"/>
+                                            </p:txEl>
+                                          </p:spTgt>
+                                        </p:tgtEl>
+                                      </p:cBhvr>
+                                    </p:animEffect>
+                                  </p:childTnLst>
+                                </p:cTn>
+                              </p:par>
+                              <p:par>
+                                <p:cTn id="8" presetID="10" presetClass="entr" presetSubtype="0" fill="hold" nodeType="withEffect">
+                                  <p:stCondLst>
+                                    <p:cond delay="0"/>
+                                  </p:stCondLst>
+                                  <p:childTnLst>
+                                    <p:set>
+                                      <p:cBhvr>
+                                        <p:cTn id="9" dur="1" fill="hold">
+                                          <p:stCondLst>
+                                            <p:cond delay="0"/>
+                                          </p:stCondLst>
+                                        </p:cTn>
+                                        <p:tgtEl>
+                                          <p:spTgt spid="3">
+                                            <p:txEl>
+                                              <p:pRg st="4" end="4"/>
+                                            </p:txEl>
+                                          </p:spTgt>
+                                        </p:tgtEl>
+                                        <p:attrNameLst>
+                                          <p:attrName>style.visibility</p:attrName>
+                                        </p:attrNameLst>
+                                      </p:cBhvr>
+                                      <p:to>
+                                        <p:strVal val="visible"/>
+                                      </p:to>
+                                    </p:set>
+                                    <p:animEffect transition="in" filter="fade">
+                                      <p:cBhvr>
+                                        <p:cTn id="10" dur="500"/>
+                                        <p:tgtEl>
+                                          <p:spTgt spid="3">
+                                            <p:txEl>
+                                              <p:pRg st="4" end="4"/>
+                                            </p:txEl>
+                                          </p:spTgt>
+                                        </p:tgtEl>
+                                      </p:cBhvr>
+                                    </p:animEffect>
+                                  </p:childTnLst>
+                                </p:cTn>
+                              </p:par>
+                            </p:childTnLst>
+                          </p:cTn>
+                        </p:par>
+                      </p:childTnLst>
+                    </p:cTn>
+                  </p:par>
+                  <p:par>
+                    <p:cTn id="11" fill="hold">
+                      <p:stCondLst>
+                        <p:cond delay="indefinite"/>
+                      </p:stCondLst>
+                      <p:childTnLst>
+                        <p:par>
+                          <p:cTn id="12" fill="hold">
+                            <p:stCondLst>
+                              <p:cond delay="0"/>
+                            </p:stCondLst>
+                            <p:childTnLst>
+                              <p:par>
+                                <p:cTn id="13" presetID="10" presetClass="entr" presetSubtype="0" fill="hold" nodeType="clickEffect">
+                                  <p:stCondLst>
+                                    <p:cond delay="0"/>
+                                  </p:stCondLst>
+                                  <p:childTnLst>
+                                    <p:set>
+                                      <p:cBhvr>
+                                        <p:cTn id="14" dur="1" fill="hold">
+                                          <p:stCondLst>
+                                            <p:cond delay="0"/>
+                                          </p:stCondLst>
+                                        </p:cTn>
+                                        <p:tgtEl>
+                                          <p:spTgt spid="3">
+                                            <p:txEl>
+                                              <p:pRg st="5" end="5"/>
+                                            </p:txEl>
+                                          </p:spTgt>
+                                        </p:tgtEl>
+                                        <p:attrNameLst>
+                                          <p:attrName>style.visibility</p:attrName>
+                                        </p:attrNameLst>
+                                      </p:cBhvr>
+                                      <p:to>
+                                        <p:strVal val="visible"/>
+                                      </p:to>
+                                    </p:set>
+                                    <p:animEffect transition="in" filter="fade">
+                                      <p:cBhvr>
+                                        <p:cTn id="15" dur="500"/>
+                                        <p:tgtEl>
+                                          <p:spTgt spid="3">
+                                            <p:txEl>
+                                              <p:pRg st="5" end="5"/>
+                                            </p:txEl>
+                                          </p:spTgt>
+                                        </p:tgtEl>
+                                      </p:cBhvr>
+                                    </p:animEffect>
+                                  </p:childTnLst>
+                                </p:cTn>
+                              </p:par>
+                              <p:par>
+                                <p:cTn id="16" presetID="10" presetClass="entr" presetSubtype="0" fill="hold" nodeType="withEffect">
+                                  <p:stCondLst>
+                                    <p:cond delay="0"/>
+                                  </p:stCondLst>
+                                  <p:childTnLst>
+                                    <p:set>
+                                      <p:cBhvr>
+                                        <p:cTn id="17" dur="1" fill="hold">
+                                          <p:stCondLst>
+                                            <p:cond delay="0"/>
+                                          </p:stCondLst>
+                                        </p:cTn>
+                                        <p:tgtEl>
+                                          <p:spTgt spid="3">
+                                            <p:txEl>
+                                              <p:pRg st="6" end="6"/>
+                                            </p:txEl>
+                                          </p:spTgt>
+                                        </p:tgtEl>
+                                        <p:attrNameLst>
+                                          <p:attrName>style.visibility</p:attrName>
+                                        </p:attrNameLst>
+                                      </p:cBhvr>
+                                      <p:to>
+                                        <p:strVal val="visible"/>
+                                      </p:to>
+                                    </p:set>
+                                    <p:animEffect transition="in" filter="fade">
+                                      <p:cBhvr>
+                                        <p:cTn id="18" dur="500"/>
+                                        <p:tgtEl>
+                                          <p:spTgt spid="3">
+                                            <p:txEl>
+                                              <p:pRg st="6" end="6"/>
+                                            </p:txEl>
+                                          </p:spTgt>
+                                        </p:tgtEl>
+                                      </p:cBhvr>
+                                    </p:animEffect>
+                                  </p:childTnLst>
+                                </p:cTn>
+                              </p:par>
+                              <p:par>
+                                <p:cTn id="19" presetID="10" presetClass="entr" presetSubtype="0" fill="hold" nodeType="withEffect">
+                                  <p:stCondLst>
+                                    <p:cond delay="0"/>
+                                  </p:stCondLst>
+                                  <p:childTnLst>
+                                    <p:set>
+                                      <p:cBhvr>
+                                        <p:cTn id="20" dur="1" fill="hold">
+                                          <p:stCondLst>
+                                            <p:cond delay="0"/>
+                                          </p:stCondLst>
+                                        </p:cTn>
+                                        <p:tgtEl>
+                                          <p:spTgt spid="3">
+                                            <p:txEl>
+                                              <p:pRg st="7" end="7"/>
+                                            </p:txEl>
+                                          </p:spTgt>
+                                        </p:tgtEl>
+                                        <p:attrNameLst>
+                                          <p:attrName>style.visibility</p:attrName>
+                                        </p:attrNameLst>
+                                      </p:cBhvr>
+                                      <p:to>
+                                        <p:strVal val="visible"/>
+                                      </p:to>
+                                    </p:set>
+                                    <p:animEffect transition="in" filter="fade">
+                                      <p:cBhvr>
+                                        <p:cTn id="21" dur="500"/>
+                                        <p:tgtEl>
+                                          <p:spTgt spid="3">
+                                            <p:txEl>
+                                              <p:pRg st="7" end="7"/>
+                                            </p:txEl>
+                                          </p:spTgt>
+                                        </p:tgtEl>
+                                      </p:cBhvr>
+                                    </p:animEffect>
+                                  </p:childTnLst>
+                                </p:cTn>
+                              </p:par>
+                            </p:childTnLst>
+                          </p:cTn>
+                        </p:par>
+                      </p:childTnLst>
+                    </p:cTn>
+                  </p:par>
+                  <p:par>
+                    <p:cTn id="22" fill="hold">
+                      <p:stCondLst>
+                        <p:cond delay="indefinite"/>
+                      </p:stCondLst>
+                      <p:childTnLst>
+                        <p:par>
+                          <p:cTn id="23" fill="hold">
+                            <p:stCondLst>
+                              <p:cond delay="0"/>
+                            </p:stCondLst>
+                            <p:childTnLst>
+                              <p:par>
+                                <p:cTn id="24" presetID="10" presetClass="entr" presetSubtype="0" fill="hold" nodeType="clickEffect">
+                                  <p:stCondLst>
+                                    <p:cond delay="0"/>
+                                  </p:stCondLst>
+                                  <p:childTnLst>
+                                    <p:set>
+                                      <p:cBhvr>
+                                        <p:cTn id="25" dur="1" fill="hold">
+                                          <p:stCondLst>
+                                            <p:cond delay="0"/>
+                                          </p:stCondLst>
+                                        </p:cTn>
+                                        <p:tgtEl>
+                                          <p:spTgt spid="3">
+                                            <p:txEl>
+                                              <p:pRg st="8" end="8"/>
+                                            </p:txEl>
+                                          </p:spTgt>
+                                        </p:tgtEl>
+                                        <p:attrNameLst>
+                                          <p:attrName>style.visibility</p:attrName>
+                                        </p:attrNameLst>
+                                      </p:cBhvr>
+                                      <p:to>
+                                        <p:strVal val="visible"/>
+                                      </p:to>
+                                    </p:set>
+                                    <p:animEffect transition="in" filter="fade">
+                                      <p:cBhvr>
+                                        <p:cTn id="26" dur="500"/>
+                                        <p:tgtEl>
+                                          <p:spTgt spid="3">
+                                            <p:txEl>
+                                              <p:pRg st="8" end="8"/>
+                                            </p:txEl>
+                                          </p:spTgt>
+                                        </p:tgtEl>
+                                      </p:cBhvr>
+                                    </p:animEffect>
+                                  </p:childTnLst>
+                                </p:cTn>
+                              </p:par>
+                              <p:par>
+                                <p:cTn id="27" presetID="10" presetClass="entr" presetSubtype="0" fill="hold" nodeType="withEffect">
+                                  <p:stCondLst>
+                                    <p:cond delay="0"/>
+                                  </p:stCondLst>
+                                  <p:childTnLst>
+                                    <p:set>
+                                      <p:cBhvr>
+                                        <p:cTn id="28" dur="1" fill="hold">
+                                          <p:stCondLst>
+                                            <p:cond delay="0"/>
+                                          </p:stCondLst>
+                                        </p:cTn>
+                                        <p:tgtEl>
+                                          <p:spTgt spid="3">
+                                            <p:txEl>
+                                              <p:pRg st="9" end="9"/>
+                                            </p:txEl>
+                                          </p:spTgt>
+                                        </p:tgtEl>
+                                        <p:attrNameLst>
+                                          <p:attrName>style.visibility</p:attrName>
+                                        </p:attrNameLst>
+                                      </p:cBhvr>
+                                      <p:to>
+                                        <p:strVal val="visible"/>
+                                      </p:to>
+                                    </p:set>
+                                    <p:animEffect transition="in" filter="fade">
+                                      <p:cBhvr>
+                                        <p:cTn id="29" dur="500"/>
+                                        <p:tgtEl>
+                                          <p:spTgt spid="3">
+                                            <p:txEl>
+                                              <p:pRg st="9" end="9"/>
+                                            </p:txEl>
+                                          </p:spTgt>
+                                        </p:tgtEl>
+                                      </p:cBhvr>
+                                    </p:animEffect>
+                                  </p:childTnLst>
+                                </p:cTn>
+                              </p:par>
+                              <p:par>
+                                <p:cTn id="30" presetID="10" presetClass="entr" presetSubtype="0" fill="hold" nodeType="withEffect">
+                                  <p:stCondLst>
+                                    <p:cond delay="0"/>
+                                  </p:stCondLst>
+                                  <p:childTnLst>
+                                    <p:set>
+                                      <p:cBhvr>
+                                        <p:cTn id="31" dur="1" fill="hold">
+                                          <p:stCondLst>
+                                            <p:cond delay="0"/>
+                                          </p:stCondLst>
+                                        </p:cTn>
+                                        <p:tgtEl>
+                                          <p:spTgt spid="3">
+                                            <p:txEl>
+                                              <p:pRg st="10" end="10"/>
+                                            </p:txEl>
+                                          </p:spTgt>
+                                        </p:tgtEl>
+                                        <p:attrNameLst>
+                                          <p:attrName>style.visibility</p:attrName>
+                                        </p:attrNameLst>
+                                      </p:cBhvr>
+                                      <p:to>
+                                        <p:strVal val="visible"/>
+                                      </p:to>
+                                    </p:set>
+                                    <p:animEffect transition="in" filter="fade">
+                                      <p:cBhvr>
+                                        <p:cTn id="32" dur="500"/>
+                                        <p:tgtEl>
+                                          <p:spTgt spid="3">
+                                            <p:txEl>
+                                              <p:pRg st="10" end="10"/>
+                                            </p:txEl>
+                                          </p:spTgt>
+                                        </p:tgtEl>
+                                      </p:cBhvr>
+                                    </p:animEffect>
+                                  </p:childTnLst>
+                                </p:cTn>
+                              </p:par>
+                            </p:childTnLst>
+                          </p:cTn>
+                        </p:par>
+                      </p:childTnLst>
+                    </p:cTn>
+                  </p:par>
+                </p:childTnLst>
+              </p:cTn>
+              <p:prevCondLst>
+                <p:cond evt="onPrev" delay="0">
+                  <p:tgtEl>
+                    <p:sldTgt/>
+                  </p:tgtEl>
+                </p:cond>
+              </p:prevCondLst>
+              <p:nextCondLst>
+                <p:cond evt="onNext" delay="0">
+                  <p:tgtEl>
+                    <p:sldTgt/>
+                  </p:tgtEl>
+                </p:cond>
+              </p:nextCondLst>
+            </p:seq>
+          </p:childTnLst>
+        </p:cTn>
+      </p:par>
+    </p:tnLst>
+  </p:timing>
 </p:sld>
 </file>
 
@@ -8909,8 +10613,8 @@
           </a:p>
         </p:txBody>
       </p:sp>
-      <mc:AlternateContent xmlns:mc="http://schemas.openxmlformats.org/markup-compatibility/2006" xmlns:a14="http://schemas.microsoft.com/office/drawing/2010/main">
-        <mc:Choice Requires="a14">
+      <mc:AlternateContent xmlns:mc="http://schemas.openxmlformats.org/markup-compatibility/2006">
+        <mc:Choice xmlns:a14="http://schemas.microsoft.com/office/drawing/2010/main" Requires="a14">
           <p:sp>
             <p:nvSpPr>
               <p:cNvPr id="3" name="Content Placeholder 2">
@@ -9898,6 +11602,7 @@
                 <a:endParaRPr lang="en-US" dirty="0"/>
               </a:p>
               <a:p>
+                <a:pPr lvl="1"/>
                 <a:r>
                   <a:rPr lang="en-US" dirty="0"/>
                   <a:t>Weights raw samples by the distance </a:t>
@@ -9955,7 +11660,7 @@
             </p:txBody>
           </p:sp>
         </mc:Choice>
-        <mc:Fallback xmlns="">
+        <mc:Fallback>
           <p:sp>
             <p:nvSpPr>
               <p:cNvPr id="3" name="Content Placeholder 2">
@@ -10111,6 +11816,373 @@
   <p:clrMapOvr>
     <a:masterClrMapping/>
   </p:clrMapOvr>
+  <p:timing>
+    <p:tnLst>
+      <p:par>
+        <p:cTn id="1" dur="indefinite" restart="never" nodeType="tmRoot">
+          <p:childTnLst>
+            <p:seq concurrent="1" nextAc="seek">
+              <p:cTn id="2" dur="indefinite" nodeType="mainSeq">
+                <p:childTnLst>
+                  <p:par>
+                    <p:cTn id="3" fill="hold">
+                      <p:stCondLst>
+                        <p:cond delay="indefinite"/>
+                      </p:stCondLst>
+                      <p:childTnLst>
+                        <p:par>
+                          <p:cTn id="4" fill="hold">
+                            <p:stCondLst>
+                              <p:cond delay="0"/>
+                            </p:stCondLst>
+                            <p:childTnLst>
+                              <p:par>
+                                <p:cTn id="5" presetID="10" presetClass="entr" presetSubtype="0" fill="hold" nodeType="clickEffect">
+                                  <p:stCondLst>
+                                    <p:cond delay="0"/>
+                                  </p:stCondLst>
+                                  <p:childTnLst>
+                                    <p:set>
+                                      <p:cBhvr>
+                                        <p:cTn id="6" dur="1" fill="hold">
+                                          <p:stCondLst>
+                                            <p:cond delay="0"/>
+                                          </p:stCondLst>
+                                        </p:cTn>
+                                        <p:tgtEl>
+                                          <p:spTgt spid="3">
+                                            <p:txEl>
+                                              <p:pRg st="3" end="3"/>
+                                            </p:txEl>
+                                          </p:spTgt>
+                                        </p:tgtEl>
+                                        <p:attrNameLst>
+                                          <p:attrName>style.visibility</p:attrName>
+                                        </p:attrNameLst>
+                                      </p:cBhvr>
+                                      <p:to>
+                                        <p:strVal val="visible"/>
+                                      </p:to>
+                                    </p:set>
+                                    <p:animEffect transition="in" filter="fade">
+                                      <p:cBhvr>
+                                        <p:cTn id="7" dur="500"/>
+                                        <p:tgtEl>
+                                          <p:spTgt spid="3">
+                                            <p:txEl>
+                                              <p:pRg st="3" end="3"/>
+                                            </p:txEl>
+                                          </p:spTgt>
+                                        </p:tgtEl>
+                                      </p:cBhvr>
+                                    </p:animEffect>
+                                  </p:childTnLst>
+                                </p:cTn>
+                              </p:par>
+                              <p:par>
+                                <p:cTn id="8" presetID="10" presetClass="entr" presetSubtype="0" fill="hold" nodeType="withEffect">
+                                  <p:stCondLst>
+                                    <p:cond delay="0"/>
+                                  </p:stCondLst>
+                                  <p:childTnLst>
+                                    <p:set>
+                                      <p:cBhvr>
+                                        <p:cTn id="9" dur="1" fill="hold">
+                                          <p:stCondLst>
+                                            <p:cond delay="0"/>
+                                          </p:stCondLst>
+                                        </p:cTn>
+                                        <p:tgtEl>
+                                          <p:spTgt spid="3">
+                                            <p:txEl>
+                                              <p:pRg st="4" end="4"/>
+                                            </p:txEl>
+                                          </p:spTgt>
+                                        </p:tgtEl>
+                                        <p:attrNameLst>
+                                          <p:attrName>style.visibility</p:attrName>
+                                        </p:attrNameLst>
+                                      </p:cBhvr>
+                                      <p:to>
+                                        <p:strVal val="visible"/>
+                                      </p:to>
+                                    </p:set>
+                                    <p:animEffect transition="in" filter="fade">
+                                      <p:cBhvr>
+                                        <p:cTn id="10" dur="500"/>
+                                        <p:tgtEl>
+                                          <p:spTgt spid="3">
+                                            <p:txEl>
+                                              <p:pRg st="4" end="4"/>
+                                            </p:txEl>
+                                          </p:spTgt>
+                                        </p:tgtEl>
+                                      </p:cBhvr>
+                                    </p:animEffect>
+                                  </p:childTnLst>
+                                </p:cTn>
+                              </p:par>
+                              <p:par>
+                                <p:cTn id="11" presetID="10" presetClass="entr" presetSubtype="0" fill="hold" nodeType="withEffect">
+                                  <p:stCondLst>
+                                    <p:cond delay="0"/>
+                                  </p:stCondLst>
+                                  <p:childTnLst>
+                                    <p:set>
+                                      <p:cBhvr>
+                                        <p:cTn id="12" dur="1" fill="hold">
+                                          <p:stCondLst>
+                                            <p:cond delay="0"/>
+                                          </p:stCondLst>
+                                        </p:cTn>
+                                        <p:tgtEl>
+                                          <p:spTgt spid="3">
+                                            <p:txEl>
+                                              <p:pRg st="5" end="5"/>
+                                            </p:txEl>
+                                          </p:spTgt>
+                                        </p:tgtEl>
+                                        <p:attrNameLst>
+                                          <p:attrName>style.visibility</p:attrName>
+                                        </p:attrNameLst>
+                                      </p:cBhvr>
+                                      <p:to>
+                                        <p:strVal val="visible"/>
+                                      </p:to>
+                                    </p:set>
+                                    <p:animEffect transition="in" filter="fade">
+                                      <p:cBhvr>
+                                        <p:cTn id="13" dur="500"/>
+                                        <p:tgtEl>
+                                          <p:spTgt spid="3">
+                                            <p:txEl>
+                                              <p:pRg st="5" end="5"/>
+                                            </p:txEl>
+                                          </p:spTgt>
+                                        </p:tgtEl>
+                                      </p:cBhvr>
+                                    </p:animEffect>
+                                  </p:childTnLst>
+                                </p:cTn>
+                              </p:par>
+                            </p:childTnLst>
+                          </p:cTn>
+                        </p:par>
+                      </p:childTnLst>
+                    </p:cTn>
+                  </p:par>
+                  <p:par>
+                    <p:cTn id="14" fill="hold">
+                      <p:stCondLst>
+                        <p:cond delay="indefinite"/>
+                      </p:stCondLst>
+                      <p:childTnLst>
+                        <p:par>
+                          <p:cTn id="15" fill="hold">
+                            <p:stCondLst>
+                              <p:cond delay="0"/>
+                            </p:stCondLst>
+                            <p:childTnLst>
+                              <p:par>
+                                <p:cTn id="16" presetID="10" presetClass="entr" presetSubtype="0" fill="hold" nodeType="clickEffect">
+                                  <p:stCondLst>
+                                    <p:cond delay="0"/>
+                                  </p:stCondLst>
+                                  <p:childTnLst>
+                                    <p:set>
+                                      <p:cBhvr>
+                                        <p:cTn id="17" dur="1" fill="hold">
+                                          <p:stCondLst>
+                                            <p:cond delay="0"/>
+                                          </p:stCondLst>
+                                        </p:cTn>
+                                        <p:tgtEl>
+                                          <p:spTgt spid="3">
+                                            <p:txEl>
+                                              <p:pRg st="6" end="6"/>
+                                            </p:txEl>
+                                          </p:spTgt>
+                                        </p:tgtEl>
+                                        <p:attrNameLst>
+                                          <p:attrName>style.visibility</p:attrName>
+                                        </p:attrNameLst>
+                                      </p:cBhvr>
+                                      <p:to>
+                                        <p:strVal val="visible"/>
+                                      </p:to>
+                                    </p:set>
+                                    <p:animEffect transition="in" filter="fade">
+                                      <p:cBhvr>
+                                        <p:cTn id="18" dur="500"/>
+                                        <p:tgtEl>
+                                          <p:spTgt spid="3">
+                                            <p:txEl>
+                                              <p:pRg st="6" end="6"/>
+                                            </p:txEl>
+                                          </p:spTgt>
+                                        </p:tgtEl>
+                                      </p:cBhvr>
+                                    </p:animEffect>
+                                  </p:childTnLst>
+                                </p:cTn>
+                              </p:par>
+                              <p:par>
+                                <p:cTn id="19" presetID="10" presetClass="entr" presetSubtype="0" fill="hold" nodeType="withEffect">
+                                  <p:stCondLst>
+                                    <p:cond delay="0"/>
+                                  </p:stCondLst>
+                                  <p:childTnLst>
+                                    <p:set>
+                                      <p:cBhvr>
+                                        <p:cTn id="20" dur="1" fill="hold">
+                                          <p:stCondLst>
+                                            <p:cond delay="0"/>
+                                          </p:stCondLst>
+                                        </p:cTn>
+                                        <p:tgtEl>
+                                          <p:spTgt spid="3">
+                                            <p:txEl>
+                                              <p:pRg st="7" end="7"/>
+                                            </p:txEl>
+                                          </p:spTgt>
+                                        </p:tgtEl>
+                                        <p:attrNameLst>
+                                          <p:attrName>style.visibility</p:attrName>
+                                        </p:attrNameLst>
+                                      </p:cBhvr>
+                                      <p:to>
+                                        <p:strVal val="visible"/>
+                                      </p:to>
+                                    </p:set>
+                                    <p:animEffect transition="in" filter="fade">
+                                      <p:cBhvr>
+                                        <p:cTn id="21" dur="500"/>
+                                        <p:tgtEl>
+                                          <p:spTgt spid="3">
+                                            <p:txEl>
+                                              <p:pRg st="7" end="7"/>
+                                            </p:txEl>
+                                          </p:spTgt>
+                                        </p:tgtEl>
+                                      </p:cBhvr>
+                                    </p:animEffect>
+                                  </p:childTnLst>
+                                </p:cTn>
+                              </p:par>
+                              <p:par>
+                                <p:cTn id="22" presetID="10" presetClass="entr" presetSubtype="0" fill="hold" nodeType="withEffect">
+                                  <p:stCondLst>
+                                    <p:cond delay="0"/>
+                                  </p:stCondLst>
+                                  <p:childTnLst>
+                                    <p:set>
+                                      <p:cBhvr>
+                                        <p:cTn id="23" dur="1" fill="hold">
+                                          <p:stCondLst>
+                                            <p:cond delay="0"/>
+                                          </p:stCondLst>
+                                        </p:cTn>
+                                        <p:tgtEl>
+                                          <p:spTgt spid="3">
+                                            <p:txEl>
+                                              <p:pRg st="8" end="8"/>
+                                            </p:txEl>
+                                          </p:spTgt>
+                                        </p:tgtEl>
+                                        <p:attrNameLst>
+                                          <p:attrName>style.visibility</p:attrName>
+                                        </p:attrNameLst>
+                                      </p:cBhvr>
+                                      <p:to>
+                                        <p:strVal val="visible"/>
+                                      </p:to>
+                                    </p:set>
+                                    <p:animEffect transition="in" filter="fade">
+                                      <p:cBhvr>
+                                        <p:cTn id="24" dur="500"/>
+                                        <p:tgtEl>
+                                          <p:spTgt spid="3">
+                                            <p:txEl>
+                                              <p:pRg st="8" end="8"/>
+                                            </p:txEl>
+                                          </p:spTgt>
+                                        </p:tgtEl>
+                                      </p:cBhvr>
+                                    </p:animEffect>
+                                  </p:childTnLst>
+                                </p:cTn>
+                              </p:par>
+                              <p:par>
+                                <p:cTn id="25" presetID="10" presetClass="entr" presetSubtype="0" fill="hold" nodeType="withEffect">
+                                  <p:stCondLst>
+                                    <p:cond delay="0"/>
+                                  </p:stCondLst>
+                                  <p:childTnLst>
+                                    <p:set>
+                                      <p:cBhvr>
+                                        <p:cTn id="26" dur="1" fill="hold">
+                                          <p:stCondLst>
+                                            <p:cond delay="0"/>
+                                          </p:stCondLst>
+                                        </p:cTn>
+                                        <p:tgtEl>
+                                          <p:spTgt spid="3">
+                                            <p:txEl>
+                                              <p:pRg st="9" end="9"/>
+                                            </p:txEl>
+                                          </p:spTgt>
+                                        </p:tgtEl>
+                                        <p:attrNameLst>
+                                          <p:attrName>style.visibility</p:attrName>
+                                        </p:attrNameLst>
+                                      </p:cBhvr>
+                                      <p:to>
+                                        <p:strVal val="visible"/>
+                                      </p:to>
+                                    </p:set>
+                                    <p:animEffect transition="in" filter="fade">
+                                      <p:cBhvr>
+                                        <p:cTn id="27" dur="500"/>
+                                        <p:tgtEl>
+                                          <p:spTgt spid="3">
+                                            <p:txEl>
+                                              <p:pRg st="9" end="9"/>
+                                            </p:txEl>
+                                          </p:spTgt>
+                                        </p:tgtEl>
+                                      </p:cBhvr>
+                                    </p:animEffect>
+                                  </p:childTnLst>
+                                </p:cTn>
+                              </p:par>
+                            </p:childTnLst>
+                          </p:cTn>
+                        </p:par>
+                      </p:childTnLst>
+                    </p:cTn>
+                  </p:par>
+                </p:childTnLst>
+              </p:cTn>
+              <p:prevCondLst>
+                <p:cond evt="onPrev" delay="0">
+                  <p:tgtEl>
+                    <p:sldTgt/>
+                  </p:tgtEl>
+                </p:cond>
+              </p:prevCondLst>
+              <p:nextCondLst>
+                <p:cond evt="onNext" delay="0">
+                  <p:tgtEl>
+                    <p:sldTgt/>
+                  </p:tgtEl>
+                </p:cond>
+              </p:nextCondLst>
+            </p:seq>
+          </p:childTnLst>
+        </p:cTn>
+      </p:par>
+    </p:tnLst>
+  </p:timing>
 </p:sld>
 </file>
 
@@ -10211,7 +12283,7 @@
           <a:p>
             <a:r>
               <a:rPr lang="en-US" dirty="0"/>
-              <a:t>Describe role and configuration of reference signals in OFDM </a:t>
+              <a:t>Configure reference signals in OFDM </a:t>
             </a:r>
           </a:p>
           <a:p>
@@ -10261,15 +12333,7 @@
           <a:p>
             <a:r>
               <a:rPr lang="en-US" dirty="0"/>
-              <a:t>Implement a simple channel estimator </a:t>
-            </a:r>
-            <a:r>
-              <a:rPr lang="en-US"/>
-              <a:t>and equalizer for </a:t>
-            </a:r>
-            <a:r>
-              <a:rPr lang="en-US" dirty="0"/>
-              <a:t>5G NR downlink</a:t>
+              <a:t>Implement a simple channel estimator and equalizer for 5G NR downlink</a:t>
             </a:r>
           </a:p>
           <a:p>
@@ -10326,7 +12390,7 @@
                                         <p:tgtEl>
                                           <p:spTgt spid="7">
                                             <p:txEl>
-                                              <p:pRg st="1" end="1"/>
+                                              <p:pRg st="0" end="0"/>
                                             </p:txEl>
                                           </p:spTgt>
                                         </p:tgtEl>
@@ -10344,7 +12408,7 @@
                                         <p:tgtEl>
                                           <p:spTgt spid="7">
                                             <p:txEl>
-                                              <p:pRg st="1" end="1"/>
+                                              <p:pRg st="0" end="0"/>
                                             </p:txEl>
                                           </p:spTgt>
                                         </p:tgtEl>
@@ -10387,7 +12451,7 @@
                                         <p:tgtEl>
                                           <p:spTgt spid="7">
                                             <p:txEl>
-                                              <p:pRg st="0" end="0"/>
+                                              <p:pRg st="1" end="1"/>
                                             </p:txEl>
                                           </p:spTgt>
                                         </p:tgtEl>
@@ -10405,7 +12469,7 @@
                                         <p:tgtEl>
                                           <p:spTgt spid="7">
                                             <p:txEl>
-                                              <p:pRg st="0" end="0"/>
+                                              <p:pRg st="1" end="1"/>
                                             </p:txEl>
                                           </p:spTgt>
                                         </p:tgtEl>
@@ -10414,33 +12478,15 @@
                                   </p:childTnLst>
                                 </p:cTn>
                               </p:par>
-                            </p:childTnLst>
-                          </p:cTn>
-                        </p:par>
-                      </p:childTnLst>
-                    </p:cTn>
-                  </p:par>
-                  <p:par>
-                    <p:cTn id="13" fill="hold">
-                      <p:stCondLst>
-                        <p:cond delay="indefinite"/>
-                      </p:stCondLst>
-                      <p:childTnLst>
-                        <p:par>
-                          <p:cTn id="14" fill="hold">
-                            <p:stCondLst>
-                              <p:cond delay="0"/>
-                            </p:stCondLst>
-                            <p:childTnLst>
                               <p:par>
-                                <p:cTn id="15" presetID="10" presetClass="entr" presetSubtype="0" fill="hold" nodeType="clickEffect">
+                                <p:cTn id="13" presetID="10" presetClass="entr" presetSubtype="0" fill="hold" nodeType="withEffect">
                                   <p:stCondLst>
                                     <p:cond delay="0"/>
                                   </p:stCondLst>
                                   <p:childTnLst>
                                     <p:set>
                                       <p:cBhvr>
-                                        <p:cTn id="16" dur="1" fill="hold">
+                                        <p:cTn id="14" dur="1" fill="hold">
                                           <p:stCondLst>
                                             <p:cond delay="0"/>
                                           </p:stCondLst>
@@ -10462,7 +12508,7 @@
                                     </p:set>
                                     <p:animEffect transition="in" filter="fade">
                                       <p:cBhvr>
-                                        <p:cTn id="17" dur="500"/>
+                                        <p:cTn id="15" dur="500"/>
                                         <p:tgtEl>
                                           <p:spTgt spid="7">
                                             <p:txEl>
@@ -10475,33 +12521,15 @@
                                   </p:childTnLst>
                                 </p:cTn>
                               </p:par>
-                            </p:childTnLst>
-                          </p:cTn>
-                        </p:par>
-                      </p:childTnLst>
-                    </p:cTn>
-                  </p:par>
-                  <p:par>
-                    <p:cTn id="18" fill="hold">
-                      <p:stCondLst>
-                        <p:cond delay="indefinite"/>
-                      </p:stCondLst>
-                      <p:childTnLst>
-                        <p:par>
-                          <p:cTn id="19" fill="hold">
-                            <p:stCondLst>
-                              <p:cond delay="0"/>
-                            </p:stCondLst>
-                            <p:childTnLst>
                               <p:par>
-                                <p:cTn id="20" presetID="10" presetClass="entr" presetSubtype="0" fill="hold" nodeType="clickEffect">
+                                <p:cTn id="16" presetID="10" presetClass="entr" presetSubtype="0" fill="hold" nodeType="withEffect">
                                   <p:stCondLst>
                                     <p:cond delay="0"/>
                                   </p:stCondLst>
                                   <p:childTnLst>
                                     <p:set>
                                       <p:cBhvr>
-                                        <p:cTn id="21" dur="1" fill="hold">
+                                        <p:cTn id="17" dur="1" fill="hold">
                                           <p:stCondLst>
                                             <p:cond delay="0"/>
                                           </p:stCondLst>
@@ -10523,7 +12551,7 @@
                                     </p:set>
                                     <p:animEffect transition="in" filter="fade">
                                       <p:cBhvr>
-                                        <p:cTn id="22" dur="500"/>
+                                        <p:cTn id="18" dur="500"/>
                                         <p:tgtEl>
                                           <p:spTgt spid="7">
                                             <p:txEl>
@@ -10543,26 +12571,26 @@
                     </p:cTn>
                   </p:par>
                   <p:par>
-                    <p:cTn id="23" fill="hold">
+                    <p:cTn id="19" fill="hold">
                       <p:stCondLst>
                         <p:cond delay="indefinite"/>
                       </p:stCondLst>
                       <p:childTnLst>
                         <p:par>
-                          <p:cTn id="24" fill="hold">
+                          <p:cTn id="20" fill="hold">
                             <p:stCondLst>
                               <p:cond delay="0"/>
                             </p:stCondLst>
                             <p:childTnLst>
                               <p:par>
-                                <p:cTn id="25" presetID="10" presetClass="entr" presetSubtype="0" fill="hold" nodeType="clickEffect">
+                                <p:cTn id="21" presetID="10" presetClass="entr" presetSubtype="0" fill="hold" nodeType="clickEffect">
                                   <p:stCondLst>
                                     <p:cond delay="0"/>
                                   </p:stCondLst>
                                   <p:childTnLst>
                                     <p:set>
                                       <p:cBhvr>
-                                        <p:cTn id="26" dur="1" fill="hold">
+                                        <p:cTn id="22" dur="1" fill="hold">
                                           <p:stCondLst>
                                             <p:cond delay="0"/>
                                           </p:stCondLst>
@@ -10584,7 +12612,7 @@
                                     </p:set>
                                     <p:animEffect transition="in" filter="fade">
                                       <p:cBhvr>
-                                        <p:cTn id="27" dur="500"/>
+                                        <p:cTn id="23" dur="500"/>
                                         <p:tgtEl>
                                           <p:spTgt spid="7">
                                             <p:txEl>
@@ -10604,26 +12632,26 @@
                     </p:cTn>
                   </p:par>
                   <p:par>
-                    <p:cTn id="28" fill="hold">
+                    <p:cTn id="24" fill="hold">
                       <p:stCondLst>
                         <p:cond delay="indefinite"/>
                       </p:stCondLst>
                       <p:childTnLst>
                         <p:par>
-                          <p:cTn id="29" fill="hold">
+                          <p:cTn id="25" fill="hold">
                             <p:stCondLst>
                               <p:cond delay="0"/>
                             </p:stCondLst>
                             <p:childTnLst>
                               <p:par>
-                                <p:cTn id="30" presetID="10" presetClass="entr" presetSubtype="0" fill="hold" nodeType="clickEffect">
+                                <p:cTn id="26" presetID="10" presetClass="entr" presetSubtype="0" fill="hold" nodeType="clickEffect">
                                   <p:stCondLst>
                                     <p:cond delay="0"/>
                                   </p:stCondLst>
                                   <p:childTnLst>
                                     <p:set>
                                       <p:cBhvr>
-                                        <p:cTn id="31" dur="1" fill="hold">
+                                        <p:cTn id="27" dur="1" fill="hold">
                                           <p:stCondLst>
                                             <p:cond delay="0"/>
                                           </p:stCondLst>
@@ -10645,7 +12673,7 @@
                                     </p:set>
                                     <p:animEffect transition="in" filter="fade">
                                       <p:cBhvr>
-                                        <p:cTn id="32" dur="500"/>
+                                        <p:cTn id="28" dur="500"/>
                                         <p:tgtEl>
                                           <p:spTgt spid="7">
                                             <p:txEl>
@@ -10658,33 +12686,15 @@
                                   </p:childTnLst>
                                 </p:cTn>
                               </p:par>
-                            </p:childTnLst>
-                          </p:cTn>
-                        </p:par>
-                      </p:childTnLst>
-                    </p:cTn>
-                  </p:par>
-                  <p:par>
-                    <p:cTn id="33" fill="hold">
-                      <p:stCondLst>
-                        <p:cond delay="indefinite"/>
-                      </p:stCondLst>
-                      <p:childTnLst>
-                        <p:par>
-                          <p:cTn id="34" fill="hold">
-                            <p:stCondLst>
-                              <p:cond delay="0"/>
-                            </p:stCondLst>
-                            <p:childTnLst>
                               <p:par>
-                                <p:cTn id="35" presetID="10" presetClass="entr" presetSubtype="0" fill="hold" nodeType="clickEffect">
+                                <p:cTn id="29" presetID="10" presetClass="entr" presetSubtype="0" fill="hold" nodeType="withEffect">
                                   <p:stCondLst>
                                     <p:cond delay="0"/>
                                   </p:stCondLst>
                                   <p:childTnLst>
                                     <p:set>
                                       <p:cBhvr>
-                                        <p:cTn id="36" dur="1" fill="hold">
+                                        <p:cTn id="30" dur="1" fill="hold">
                                           <p:stCondLst>
                                             <p:cond delay="0"/>
                                           </p:stCondLst>
@@ -10706,7 +12716,7 @@
                                     </p:set>
                                     <p:animEffect transition="in" filter="fade">
                                       <p:cBhvr>
-                                        <p:cTn id="37" dur="500"/>
+                                        <p:cTn id="31" dur="500"/>
                                         <p:tgtEl>
                                           <p:spTgt spid="7">
                                             <p:txEl>
@@ -10726,26 +12736,26 @@
                     </p:cTn>
                   </p:par>
                   <p:par>
-                    <p:cTn id="38" fill="hold">
+                    <p:cTn id="32" fill="hold">
                       <p:stCondLst>
                         <p:cond delay="indefinite"/>
                       </p:stCondLst>
                       <p:childTnLst>
                         <p:par>
-                          <p:cTn id="39" fill="hold">
+                          <p:cTn id="33" fill="hold">
                             <p:stCondLst>
                               <p:cond delay="0"/>
                             </p:stCondLst>
                             <p:childTnLst>
                               <p:par>
-                                <p:cTn id="40" presetID="10" presetClass="entr" presetSubtype="0" fill="hold" nodeType="clickEffect">
+                                <p:cTn id="34" presetID="10" presetClass="entr" presetSubtype="0" fill="hold" nodeType="clickEffect">
                                   <p:stCondLst>
                                     <p:cond delay="0"/>
                                   </p:stCondLst>
                                   <p:childTnLst>
                                     <p:set>
                                       <p:cBhvr>
-                                        <p:cTn id="41" dur="1" fill="hold">
+                                        <p:cTn id="35" dur="1" fill="hold">
                                           <p:stCondLst>
                                             <p:cond delay="0"/>
                                           </p:stCondLst>
@@ -10767,7 +12777,7 @@
                                     </p:set>
                                     <p:animEffect transition="in" filter="fade">
                                       <p:cBhvr>
-                                        <p:cTn id="42" dur="500"/>
+                                        <p:cTn id="36" dur="500"/>
                                         <p:tgtEl>
                                           <p:spTgt spid="7">
                                             <p:txEl>
@@ -10780,33 +12790,15 @@
                                   </p:childTnLst>
                                 </p:cTn>
                               </p:par>
-                            </p:childTnLst>
-                          </p:cTn>
-                        </p:par>
-                      </p:childTnLst>
-                    </p:cTn>
-                  </p:par>
-                  <p:par>
-                    <p:cTn id="43" fill="hold">
-                      <p:stCondLst>
-                        <p:cond delay="indefinite"/>
-                      </p:stCondLst>
-                      <p:childTnLst>
-                        <p:par>
-                          <p:cTn id="44" fill="hold">
-                            <p:stCondLst>
-                              <p:cond delay="0"/>
-                            </p:stCondLst>
-                            <p:childTnLst>
                               <p:par>
-                                <p:cTn id="45" presetID="10" presetClass="entr" presetSubtype="0" fill="hold" nodeType="clickEffect">
+                                <p:cTn id="37" presetID="10" presetClass="entr" presetSubtype="0" fill="hold" nodeType="withEffect">
                                   <p:stCondLst>
                                     <p:cond delay="0"/>
                                   </p:stCondLst>
                                   <p:childTnLst>
                                     <p:set>
                                       <p:cBhvr>
-                                        <p:cTn id="46" dur="1" fill="hold">
+                                        <p:cTn id="38" dur="1" fill="hold">
                                           <p:stCondLst>
                                             <p:cond delay="0"/>
                                           </p:stCondLst>
@@ -10828,7 +12820,7 @@
                                     </p:set>
                                     <p:animEffect transition="in" filter="fade">
                                       <p:cBhvr>
-                                        <p:cTn id="47" dur="500"/>
+                                        <p:cTn id="39" dur="500"/>
                                         <p:tgtEl>
                                           <p:spTgt spid="7">
                                             <p:txEl>
@@ -10848,26 +12840,26 @@
                     </p:cTn>
                   </p:par>
                   <p:par>
-                    <p:cTn id="48" fill="hold">
+                    <p:cTn id="40" fill="hold">
                       <p:stCondLst>
                         <p:cond delay="indefinite"/>
                       </p:stCondLst>
                       <p:childTnLst>
                         <p:par>
-                          <p:cTn id="49" fill="hold">
+                          <p:cTn id="41" fill="hold">
                             <p:stCondLst>
                               <p:cond delay="0"/>
                             </p:stCondLst>
                             <p:childTnLst>
                               <p:par>
-                                <p:cTn id="50" presetID="10" presetClass="entr" presetSubtype="0" fill="hold" nodeType="clickEffect">
+                                <p:cTn id="42" presetID="10" presetClass="entr" presetSubtype="0" fill="hold" nodeType="clickEffect">
                                   <p:stCondLst>
                                     <p:cond delay="0"/>
                                   </p:stCondLst>
                                   <p:childTnLst>
                                     <p:set>
                                       <p:cBhvr>
-                                        <p:cTn id="51" dur="1" fill="hold">
+                                        <p:cTn id="43" dur="1" fill="hold">
                                           <p:stCondLst>
                                             <p:cond delay="0"/>
                                           </p:stCondLst>
@@ -10889,7 +12881,7 @@
                                     </p:set>
                                     <p:animEffect transition="in" filter="fade">
                                       <p:cBhvr>
-                                        <p:cTn id="52" dur="500"/>
+                                        <p:cTn id="44" dur="500"/>
                                         <p:tgtEl>
                                           <p:spTgt spid="7">
                                             <p:txEl>
@@ -11429,8 +13421,8 @@
           </a:p>
         </p:txBody>
       </p:sp>
-      <mc:AlternateContent xmlns:mc="http://schemas.openxmlformats.org/markup-compatibility/2006">
-        <mc:Choice xmlns:a14="http://schemas.microsoft.com/office/drawing/2010/main" Requires="a14">
+      <mc:AlternateContent xmlns:mc="http://schemas.openxmlformats.org/markup-compatibility/2006" xmlns:a14="http://schemas.microsoft.com/office/drawing/2010/main">
+        <mc:Choice Requires="a14">
           <p:sp>
             <p:nvSpPr>
               <p:cNvPr id="3" name="Content Placeholder 2">
@@ -11781,7 +13773,7 @@
             </p:txBody>
           </p:sp>
         </mc:Choice>
-        <mc:Fallback>
+        <mc:Fallback xmlns="">
           <p:sp>
             <p:nvSpPr>
               <p:cNvPr id="3" name="Content Placeholder 2">
@@ -11970,8 +13962,8 @@
           </a:p>
         </p:txBody>
       </p:sp>
-      <mc:AlternateContent xmlns:mc="http://schemas.openxmlformats.org/markup-compatibility/2006">
-        <mc:Choice xmlns:a14="http://schemas.microsoft.com/office/drawing/2010/main" Requires="a14">
+      <mc:AlternateContent xmlns:mc="http://schemas.openxmlformats.org/markup-compatibility/2006" xmlns:a14="http://schemas.microsoft.com/office/drawing/2010/main">
+        <mc:Choice Requires="a14">
           <p:sp>
             <p:nvSpPr>
               <p:cNvPr id="6" name="TextBox 5">
@@ -12000,6 +13992,7 @@
               </a:bodyPr>
               <a:lstStyle/>
               <a:p>
+                <a:pPr/>
                 <a:r>
                   <a:rPr lang="en-US" b="0" dirty="0"/>
                   <a:t>Channel estimate at</a:t>
@@ -12058,7 +14051,7 @@
             </p:txBody>
           </p:sp>
         </mc:Choice>
-        <mc:Fallback>
+        <mc:Fallback xmlns="">
           <p:sp>
             <p:nvSpPr>
               <p:cNvPr id="6" name="TextBox 5">
@@ -12154,6 +14147,289 @@
   <p:clrMapOvr>
     <a:masterClrMapping/>
   </p:clrMapOvr>
+  <p:timing>
+    <p:tnLst>
+      <p:par>
+        <p:cTn id="1" dur="indefinite" restart="never" nodeType="tmRoot">
+          <p:childTnLst>
+            <p:seq concurrent="1" nextAc="seek">
+              <p:cTn id="2" dur="indefinite" nodeType="mainSeq">
+                <p:childTnLst>
+                  <p:par>
+                    <p:cTn id="3" fill="hold">
+                      <p:stCondLst>
+                        <p:cond delay="indefinite"/>
+                      </p:stCondLst>
+                      <p:childTnLst>
+                        <p:par>
+                          <p:cTn id="4" fill="hold">
+                            <p:stCondLst>
+                              <p:cond delay="0"/>
+                            </p:stCondLst>
+                            <p:childTnLst>
+                              <p:par>
+                                <p:cTn id="5" presetID="1" presetClass="entr" presetSubtype="0" fill="hold" nodeType="clickEffect">
+                                  <p:stCondLst>
+                                    <p:cond delay="0"/>
+                                  </p:stCondLst>
+                                  <p:childTnLst>
+                                    <p:set>
+                                      <p:cBhvr>
+                                        <p:cTn id="6" dur="1" fill="hold">
+                                          <p:stCondLst>
+                                            <p:cond delay="0"/>
+                                          </p:stCondLst>
+                                        </p:cTn>
+                                        <p:tgtEl>
+                                          <p:spTgt spid="3">
+                                            <p:txEl>
+                                              <p:pRg st="3" end="3"/>
+                                            </p:txEl>
+                                          </p:spTgt>
+                                        </p:tgtEl>
+                                        <p:attrNameLst>
+                                          <p:attrName>style.visibility</p:attrName>
+                                        </p:attrNameLst>
+                                      </p:cBhvr>
+                                      <p:to>
+                                        <p:strVal val="visible"/>
+                                      </p:to>
+                                    </p:set>
+                                  </p:childTnLst>
+                                </p:cTn>
+                              </p:par>
+                              <p:par>
+                                <p:cTn id="7" presetID="1" presetClass="entr" presetSubtype="0" fill="hold" nodeType="withEffect">
+                                  <p:stCondLst>
+                                    <p:cond delay="0"/>
+                                  </p:stCondLst>
+                                  <p:childTnLst>
+                                    <p:set>
+                                      <p:cBhvr>
+                                        <p:cTn id="8" dur="1" fill="hold">
+                                          <p:stCondLst>
+                                            <p:cond delay="0"/>
+                                          </p:stCondLst>
+                                        </p:cTn>
+                                        <p:tgtEl>
+                                          <p:spTgt spid="3">
+                                            <p:txEl>
+                                              <p:pRg st="4" end="4"/>
+                                            </p:txEl>
+                                          </p:spTgt>
+                                        </p:tgtEl>
+                                        <p:attrNameLst>
+                                          <p:attrName>style.visibility</p:attrName>
+                                        </p:attrNameLst>
+                                      </p:cBhvr>
+                                      <p:to>
+                                        <p:strVal val="visible"/>
+                                      </p:to>
+                                    </p:set>
+                                  </p:childTnLst>
+                                </p:cTn>
+                              </p:par>
+                              <p:par>
+                                <p:cTn id="9" presetID="1" presetClass="entr" presetSubtype="0" fill="hold" nodeType="withEffect">
+                                  <p:stCondLst>
+                                    <p:cond delay="0"/>
+                                  </p:stCondLst>
+                                  <p:childTnLst>
+                                    <p:set>
+                                      <p:cBhvr>
+                                        <p:cTn id="10" dur="1" fill="hold">
+                                          <p:stCondLst>
+                                            <p:cond delay="0"/>
+                                          </p:stCondLst>
+                                        </p:cTn>
+                                        <p:tgtEl>
+                                          <p:spTgt spid="3">
+                                            <p:txEl>
+                                              <p:pRg st="5" end="5"/>
+                                            </p:txEl>
+                                          </p:spTgt>
+                                        </p:tgtEl>
+                                        <p:attrNameLst>
+                                          <p:attrName>style.visibility</p:attrName>
+                                        </p:attrNameLst>
+                                      </p:cBhvr>
+                                      <p:to>
+                                        <p:strVal val="visible"/>
+                                      </p:to>
+                                    </p:set>
+                                  </p:childTnLst>
+                                </p:cTn>
+                              </p:par>
+                              <p:par>
+                                <p:cTn id="11" presetID="1" presetClass="entr" presetSubtype="0" fill="hold" nodeType="withEffect">
+                                  <p:stCondLst>
+                                    <p:cond delay="0"/>
+                                  </p:stCondLst>
+                                  <p:childTnLst>
+                                    <p:set>
+                                      <p:cBhvr>
+                                        <p:cTn id="12" dur="1" fill="hold">
+                                          <p:stCondLst>
+                                            <p:cond delay="0"/>
+                                          </p:stCondLst>
+                                        </p:cTn>
+                                        <p:tgtEl>
+                                          <p:spTgt spid="3">
+                                            <p:txEl>
+                                              <p:pRg st="6" end="6"/>
+                                            </p:txEl>
+                                          </p:spTgt>
+                                        </p:tgtEl>
+                                        <p:attrNameLst>
+                                          <p:attrName>style.visibility</p:attrName>
+                                        </p:attrNameLst>
+                                      </p:cBhvr>
+                                      <p:to>
+                                        <p:strVal val="visible"/>
+                                      </p:to>
+                                    </p:set>
+                                  </p:childTnLst>
+                                </p:cTn>
+                              </p:par>
+                            </p:childTnLst>
+                          </p:cTn>
+                        </p:par>
+                      </p:childTnLst>
+                    </p:cTn>
+                  </p:par>
+                  <p:par>
+                    <p:cTn id="13" fill="hold">
+                      <p:stCondLst>
+                        <p:cond delay="indefinite"/>
+                      </p:stCondLst>
+                      <p:childTnLst>
+                        <p:par>
+                          <p:cTn id="14" fill="hold">
+                            <p:stCondLst>
+                              <p:cond delay="0"/>
+                            </p:stCondLst>
+                            <p:childTnLst>
+                              <p:par>
+                                <p:cTn id="15" presetID="1" presetClass="entr" presetSubtype="0" fill="hold" nodeType="clickEffect">
+                                  <p:stCondLst>
+                                    <p:cond delay="0"/>
+                                  </p:stCondLst>
+                                  <p:childTnLst>
+                                    <p:set>
+                                      <p:cBhvr>
+                                        <p:cTn id="16" dur="1" fill="hold">
+                                          <p:stCondLst>
+                                            <p:cond delay="0"/>
+                                          </p:stCondLst>
+                                        </p:cTn>
+                                        <p:tgtEl>
+                                          <p:spTgt spid="3">
+                                            <p:txEl>
+                                              <p:pRg st="7" end="7"/>
+                                            </p:txEl>
+                                          </p:spTgt>
+                                        </p:tgtEl>
+                                        <p:attrNameLst>
+                                          <p:attrName>style.visibility</p:attrName>
+                                        </p:attrNameLst>
+                                      </p:cBhvr>
+                                      <p:to>
+                                        <p:strVal val="visible"/>
+                                      </p:to>
+                                    </p:set>
+                                  </p:childTnLst>
+                                </p:cTn>
+                              </p:par>
+                              <p:par>
+                                <p:cTn id="17" presetID="1" presetClass="entr" presetSubtype="0" fill="hold" nodeType="withEffect">
+                                  <p:stCondLst>
+                                    <p:cond delay="0"/>
+                                  </p:stCondLst>
+                                  <p:childTnLst>
+                                    <p:set>
+                                      <p:cBhvr>
+                                        <p:cTn id="18" dur="1" fill="hold">
+                                          <p:stCondLst>
+                                            <p:cond delay="0"/>
+                                          </p:stCondLst>
+                                        </p:cTn>
+                                        <p:tgtEl>
+                                          <p:spTgt spid="3">
+                                            <p:txEl>
+                                              <p:pRg st="8" end="8"/>
+                                            </p:txEl>
+                                          </p:spTgt>
+                                        </p:tgtEl>
+                                        <p:attrNameLst>
+                                          <p:attrName>style.visibility</p:attrName>
+                                        </p:attrNameLst>
+                                      </p:cBhvr>
+                                      <p:to>
+                                        <p:strVal val="visible"/>
+                                      </p:to>
+                                    </p:set>
+                                  </p:childTnLst>
+                                </p:cTn>
+                              </p:par>
+                              <p:par>
+                                <p:cTn id="19" presetID="1" presetClass="entr" presetSubtype="0" fill="hold" nodeType="withEffect">
+                                  <p:stCondLst>
+                                    <p:cond delay="0"/>
+                                  </p:stCondLst>
+                                  <p:childTnLst>
+                                    <p:set>
+                                      <p:cBhvr>
+                                        <p:cTn id="20" dur="1" fill="hold">
+                                          <p:stCondLst>
+                                            <p:cond delay="0"/>
+                                          </p:stCondLst>
+                                        </p:cTn>
+                                        <p:tgtEl>
+                                          <p:spTgt spid="3">
+                                            <p:txEl>
+                                              <p:pRg st="9" end="9"/>
+                                            </p:txEl>
+                                          </p:spTgt>
+                                        </p:tgtEl>
+                                        <p:attrNameLst>
+                                          <p:attrName>style.visibility</p:attrName>
+                                        </p:attrNameLst>
+                                      </p:cBhvr>
+                                      <p:to>
+                                        <p:strVal val="visible"/>
+                                      </p:to>
+                                    </p:set>
+                                  </p:childTnLst>
+                                </p:cTn>
+                              </p:par>
+                            </p:childTnLst>
+                          </p:cTn>
+                        </p:par>
+                      </p:childTnLst>
+                    </p:cTn>
+                  </p:par>
+                </p:childTnLst>
+              </p:cTn>
+              <p:prevCondLst>
+                <p:cond evt="onPrev" delay="0">
+                  <p:tgtEl>
+                    <p:sldTgt/>
+                  </p:tgtEl>
+                </p:cond>
+              </p:prevCondLst>
+              <p:nextCondLst>
+                <p:cond evt="onNext" delay="0">
+                  <p:tgtEl>
+                    <p:sldTgt/>
+                  </p:tgtEl>
+                </p:cond>
+              </p:nextCondLst>
+            </p:seq>
+          </p:childTnLst>
+        </p:cTn>
+      </p:par>
+    </p:tnLst>
+  </p:timing>
 </p:sld>
 </file>
 
@@ -23274,8 +25550,8 @@
           </a:p>
         </p:txBody>
       </p:sp>
-      <mc:AlternateContent xmlns:mc="http://schemas.openxmlformats.org/markup-compatibility/2006">
-        <mc:Choice xmlns:a14="http://schemas.microsoft.com/office/drawing/2010/main" Requires="a14">
+      <mc:AlternateContent xmlns:mc="http://schemas.openxmlformats.org/markup-compatibility/2006" xmlns:a14="http://schemas.microsoft.com/office/drawing/2010/main">
+        <mc:Choice Requires="a14">
           <p:sp>
             <p:nvSpPr>
               <p:cNvPr id="3" name="Content Placeholder 2">
@@ -24513,7 +26789,7 @@
             </p:txBody>
           </p:sp>
         </mc:Choice>
-        <mc:Fallback>
+        <mc:Fallback xmlns="">
           <p:sp>
             <p:nvSpPr>
               <p:cNvPr id="3" name="Content Placeholder 2">
@@ -24694,8 +26970,8 @@
           </a:p>
         </p:txBody>
       </p:sp>
-      <mc:AlternateContent xmlns:mc="http://schemas.openxmlformats.org/markup-compatibility/2006">
-        <mc:Choice xmlns:a14="http://schemas.microsoft.com/office/drawing/2010/main" Requires="a14">
+      <mc:AlternateContent xmlns:mc="http://schemas.openxmlformats.org/markup-compatibility/2006" xmlns:a14="http://schemas.microsoft.com/office/drawing/2010/main">
+        <mc:Choice Requires="a14">
           <p:sp>
             <p:nvSpPr>
               <p:cNvPr id="3" name="Content Placeholder 2">
@@ -26243,7 +28519,7 @@
             </p:txBody>
           </p:sp>
         </mc:Choice>
-        <mc:Fallback>
+        <mc:Fallback xmlns="">
           <p:sp>
             <p:nvSpPr>
               <p:cNvPr id="3" name="Content Placeholder 2">
@@ -27519,8 +29795,8 @@
           </a:p>
         </p:txBody>
       </p:sp>
-      <mc:AlternateContent xmlns:mc="http://schemas.openxmlformats.org/markup-compatibility/2006">
-        <mc:Choice xmlns:a14="http://schemas.microsoft.com/office/drawing/2010/main" Requires="a14">
+      <mc:AlternateContent xmlns:mc="http://schemas.openxmlformats.org/markup-compatibility/2006" xmlns:a14="http://schemas.microsoft.com/office/drawing/2010/main">
+        <mc:Choice Requires="a14">
           <p:sp>
             <p:nvSpPr>
               <p:cNvPr id="3" name="Content Placeholder 2">
@@ -28553,7 +30829,7 @@
             </p:txBody>
           </p:sp>
         </mc:Choice>
-        <mc:Fallback>
+        <mc:Fallback xmlns="">
           <p:sp>
             <p:nvSpPr>
               <p:cNvPr id="3" name="Content Placeholder 2">
@@ -28680,8 +30956,8 @@
           </a:p>
         </p:txBody>
       </p:sp>
-      <mc:AlternateContent xmlns:mc="http://schemas.openxmlformats.org/markup-compatibility/2006">
-        <mc:Choice xmlns:a14="http://schemas.microsoft.com/office/drawing/2010/main" Requires="a14">
+      <mc:AlternateContent xmlns:mc="http://schemas.openxmlformats.org/markup-compatibility/2006" xmlns:a14="http://schemas.microsoft.com/office/drawing/2010/main">
+        <mc:Choice Requires="a14">
           <p:sp>
             <p:nvSpPr>
               <p:cNvPr id="3" name="Content Placeholder 2">
@@ -29195,7 +31471,7 @@
             </p:txBody>
           </p:sp>
         </mc:Choice>
-        <mc:Fallback>
+        <mc:Fallback xmlns="">
           <p:sp>
             <p:nvSpPr>
               <p:cNvPr id="3" name="Content Placeholder 2">
@@ -29322,8 +31598,8 @@
           </a:p>
         </p:txBody>
       </p:sp>
-      <mc:AlternateContent xmlns:mc="http://schemas.openxmlformats.org/markup-compatibility/2006">
-        <mc:Choice xmlns:a14="http://schemas.microsoft.com/office/drawing/2010/main" Requires="a14">
+      <mc:AlternateContent xmlns:mc="http://schemas.openxmlformats.org/markup-compatibility/2006" xmlns:a14="http://schemas.microsoft.com/office/drawing/2010/main">
+        <mc:Choice Requires="a14">
           <p:sp>
             <p:nvSpPr>
               <p:cNvPr id="3" name="Content Placeholder 2">
@@ -29521,7 +31797,7 @@
             </p:txBody>
           </p:sp>
         </mc:Choice>
-        <mc:Fallback>
+        <mc:Fallback xmlns="">
           <p:sp>
             <p:nvSpPr>
               <p:cNvPr id="3" name="Content Placeholder 2">
@@ -29929,8 +32205,8 @@
           </a:p>
         </p:txBody>
       </p:sp>
-      <mc:AlternateContent xmlns:mc="http://schemas.openxmlformats.org/markup-compatibility/2006">
-        <mc:Choice xmlns:a14="http://schemas.microsoft.com/office/drawing/2010/main" Requires="a14">
+      <mc:AlternateContent xmlns:mc="http://schemas.openxmlformats.org/markup-compatibility/2006" xmlns:a14="http://schemas.microsoft.com/office/drawing/2010/main">
+        <mc:Choice Requires="a14">
           <p:sp>
             <p:nvSpPr>
               <p:cNvPr id="3" name="Content Placeholder 2">
@@ -30729,7 +33005,7 @@
             </p:txBody>
           </p:sp>
         </mc:Choice>
-        <mc:Fallback>
+        <mc:Fallback xmlns="">
           <p:sp>
             <p:nvSpPr>
               <p:cNvPr id="3" name="Content Placeholder 2">
@@ -31033,8 +33309,8 @@
           </a:fontRef>
         </p:style>
       </p:cxnSp>
-      <mc:AlternateContent xmlns:mc="http://schemas.openxmlformats.org/markup-compatibility/2006">
-        <mc:Choice xmlns:a14="http://schemas.microsoft.com/office/drawing/2010/main" Requires="a14">
+      <mc:AlternateContent xmlns:mc="http://schemas.openxmlformats.org/markup-compatibility/2006" xmlns:a14="http://schemas.microsoft.com/office/drawing/2010/main">
+        <mc:Choice Requires="a14">
           <p:sp>
             <p:nvSpPr>
               <p:cNvPr id="13" name="TextBox 12">
@@ -31114,7 +33390,7 @@
             </p:txBody>
           </p:sp>
         </mc:Choice>
-        <mc:Fallback>
+        <mc:Fallback xmlns="">
           <p:sp>
             <p:nvSpPr>
               <p:cNvPr id="13" name="TextBox 12">
@@ -31159,8 +33435,8 @@
           </p:sp>
         </mc:Fallback>
       </mc:AlternateContent>
-      <mc:AlternateContent xmlns:mc="http://schemas.openxmlformats.org/markup-compatibility/2006">
-        <mc:Choice xmlns:a14="http://schemas.microsoft.com/office/drawing/2010/main" Requires="a14">
+      <mc:AlternateContent xmlns:mc="http://schemas.openxmlformats.org/markup-compatibility/2006" xmlns:a14="http://schemas.microsoft.com/office/drawing/2010/main">
+        <mc:Choice Requires="a14">
           <p:sp>
             <p:nvSpPr>
               <p:cNvPr id="14" name="TextBox 13">
@@ -31240,7 +33516,7 @@
             </p:txBody>
           </p:sp>
         </mc:Choice>
-        <mc:Fallback>
+        <mc:Fallback xmlns="">
           <p:sp>
             <p:nvSpPr>
               <p:cNvPr id="14" name="TextBox 13">
@@ -31285,8 +33561,8 @@
           </p:sp>
         </mc:Fallback>
       </mc:AlternateContent>
-      <mc:AlternateContent xmlns:mc="http://schemas.openxmlformats.org/markup-compatibility/2006">
-        <mc:Choice xmlns:a14="http://schemas.microsoft.com/office/drawing/2010/main" Requires="a14">
+      <mc:AlternateContent xmlns:mc="http://schemas.openxmlformats.org/markup-compatibility/2006" xmlns:a14="http://schemas.microsoft.com/office/drawing/2010/main">
+        <mc:Choice Requires="a14">
           <p:sp>
             <p:nvSpPr>
               <p:cNvPr id="15" name="TextBox 14">
@@ -31421,7 +33697,7 @@
             </p:txBody>
           </p:sp>
         </mc:Choice>
-        <mc:Fallback>
+        <mc:Fallback xmlns="">
           <p:sp>
             <p:nvSpPr>
               <p:cNvPr id="15" name="TextBox 14">
@@ -31466,8 +33742,8 @@
           </p:sp>
         </mc:Fallback>
       </mc:AlternateContent>
-      <mc:AlternateContent xmlns:mc="http://schemas.openxmlformats.org/markup-compatibility/2006">
-        <mc:Choice xmlns:a14="http://schemas.microsoft.com/office/drawing/2010/main" Requires="a14">
+      <mc:AlternateContent xmlns:mc="http://schemas.openxmlformats.org/markup-compatibility/2006" xmlns:a14="http://schemas.microsoft.com/office/drawing/2010/main">
+        <mc:Choice Requires="a14">
           <p:sp>
             <p:nvSpPr>
               <p:cNvPr id="16" name="TextBox 15">
@@ -31545,7 +33821,7 @@
             </p:txBody>
           </p:sp>
         </mc:Choice>
-        <mc:Fallback>
+        <mc:Fallback xmlns="">
           <p:sp>
             <p:nvSpPr>
               <p:cNvPr id="16" name="TextBox 15">
@@ -31783,6 +34059,300 @@
   <p:clrMapOvr>
     <a:masterClrMapping/>
   </p:clrMapOvr>
+  <p:timing>
+    <p:tnLst>
+      <p:par>
+        <p:cTn id="1" dur="indefinite" restart="never" nodeType="tmRoot">
+          <p:childTnLst>
+            <p:seq concurrent="1" nextAc="seek">
+              <p:cTn id="2" dur="indefinite" nodeType="mainSeq">
+                <p:childTnLst>
+                  <p:par>
+                    <p:cTn id="3" fill="hold">
+                      <p:stCondLst>
+                        <p:cond delay="indefinite"/>
+                      </p:stCondLst>
+                      <p:childTnLst>
+                        <p:par>
+                          <p:cTn id="4" fill="hold">
+                            <p:stCondLst>
+                              <p:cond delay="0"/>
+                            </p:stCondLst>
+                            <p:childTnLst>
+                              <p:par>
+                                <p:cTn id="5" presetID="10" presetClass="entr" presetSubtype="0" fill="hold" nodeType="clickEffect">
+                                  <p:stCondLst>
+                                    <p:cond delay="0"/>
+                                  </p:stCondLst>
+                                  <p:childTnLst>
+                                    <p:set>
+                                      <p:cBhvr>
+                                        <p:cTn id="6" dur="1" fill="hold">
+                                          <p:stCondLst>
+                                            <p:cond delay="0"/>
+                                          </p:stCondLst>
+                                        </p:cTn>
+                                        <p:tgtEl>
+                                          <p:spTgt spid="3">
+                                            <p:txEl>
+                                              <p:pRg st="0" end="0"/>
+                                            </p:txEl>
+                                          </p:spTgt>
+                                        </p:tgtEl>
+                                        <p:attrNameLst>
+                                          <p:attrName>style.visibility</p:attrName>
+                                        </p:attrNameLst>
+                                      </p:cBhvr>
+                                      <p:to>
+                                        <p:strVal val="visible"/>
+                                      </p:to>
+                                    </p:set>
+                                    <p:animEffect transition="in" filter="fade">
+                                      <p:cBhvr>
+                                        <p:cTn id="7" dur="500"/>
+                                        <p:tgtEl>
+                                          <p:spTgt spid="3">
+                                            <p:txEl>
+                                              <p:pRg st="0" end="0"/>
+                                            </p:txEl>
+                                          </p:spTgt>
+                                        </p:tgtEl>
+                                      </p:cBhvr>
+                                    </p:animEffect>
+                                  </p:childTnLst>
+                                </p:cTn>
+                              </p:par>
+                              <p:par>
+                                <p:cTn id="8" presetID="10" presetClass="entr" presetSubtype="0" fill="hold" nodeType="withEffect">
+                                  <p:stCondLst>
+                                    <p:cond delay="0"/>
+                                  </p:stCondLst>
+                                  <p:childTnLst>
+                                    <p:set>
+                                      <p:cBhvr>
+                                        <p:cTn id="9" dur="1" fill="hold">
+                                          <p:stCondLst>
+                                            <p:cond delay="0"/>
+                                          </p:stCondLst>
+                                        </p:cTn>
+                                        <p:tgtEl>
+                                          <p:spTgt spid="3">
+                                            <p:txEl>
+                                              <p:pRg st="1" end="1"/>
+                                            </p:txEl>
+                                          </p:spTgt>
+                                        </p:tgtEl>
+                                        <p:attrNameLst>
+                                          <p:attrName>style.visibility</p:attrName>
+                                        </p:attrNameLst>
+                                      </p:cBhvr>
+                                      <p:to>
+                                        <p:strVal val="visible"/>
+                                      </p:to>
+                                    </p:set>
+                                    <p:animEffect transition="in" filter="fade">
+                                      <p:cBhvr>
+                                        <p:cTn id="10" dur="500"/>
+                                        <p:tgtEl>
+                                          <p:spTgt spid="3">
+                                            <p:txEl>
+                                              <p:pRg st="1" end="1"/>
+                                            </p:txEl>
+                                          </p:spTgt>
+                                        </p:tgtEl>
+                                      </p:cBhvr>
+                                    </p:animEffect>
+                                  </p:childTnLst>
+                                </p:cTn>
+                              </p:par>
+                            </p:childTnLst>
+                          </p:cTn>
+                        </p:par>
+                      </p:childTnLst>
+                    </p:cTn>
+                  </p:par>
+                  <p:par>
+                    <p:cTn id="11" fill="hold">
+                      <p:stCondLst>
+                        <p:cond delay="indefinite"/>
+                      </p:stCondLst>
+                      <p:childTnLst>
+                        <p:par>
+                          <p:cTn id="12" fill="hold">
+                            <p:stCondLst>
+                              <p:cond delay="0"/>
+                            </p:stCondLst>
+                            <p:childTnLst>
+                              <p:par>
+                                <p:cTn id="13" presetID="10" presetClass="entr" presetSubtype="0" fill="hold" nodeType="clickEffect">
+                                  <p:stCondLst>
+                                    <p:cond delay="0"/>
+                                  </p:stCondLst>
+                                  <p:childTnLst>
+                                    <p:set>
+                                      <p:cBhvr>
+                                        <p:cTn id="14" dur="1" fill="hold">
+                                          <p:stCondLst>
+                                            <p:cond delay="0"/>
+                                          </p:stCondLst>
+                                        </p:cTn>
+                                        <p:tgtEl>
+                                          <p:spTgt spid="3">
+                                            <p:txEl>
+                                              <p:pRg st="2" end="2"/>
+                                            </p:txEl>
+                                          </p:spTgt>
+                                        </p:tgtEl>
+                                        <p:attrNameLst>
+                                          <p:attrName>style.visibility</p:attrName>
+                                        </p:attrNameLst>
+                                      </p:cBhvr>
+                                      <p:to>
+                                        <p:strVal val="visible"/>
+                                      </p:to>
+                                    </p:set>
+                                    <p:animEffect transition="in" filter="fade">
+                                      <p:cBhvr>
+                                        <p:cTn id="15" dur="500"/>
+                                        <p:tgtEl>
+                                          <p:spTgt spid="3">
+                                            <p:txEl>
+                                              <p:pRg st="2" end="2"/>
+                                            </p:txEl>
+                                          </p:spTgt>
+                                        </p:tgtEl>
+                                      </p:cBhvr>
+                                    </p:animEffect>
+                                  </p:childTnLst>
+                                </p:cTn>
+                              </p:par>
+                              <p:par>
+                                <p:cTn id="16" presetID="10" presetClass="entr" presetSubtype="0" fill="hold" nodeType="withEffect">
+                                  <p:stCondLst>
+                                    <p:cond delay="0"/>
+                                  </p:stCondLst>
+                                  <p:childTnLst>
+                                    <p:set>
+                                      <p:cBhvr>
+                                        <p:cTn id="17" dur="1" fill="hold">
+                                          <p:stCondLst>
+                                            <p:cond delay="0"/>
+                                          </p:stCondLst>
+                                        </p:cTn>
+                                        <p:tgtEl>
+                                          <p:spTgt spid="3">
+                                            <p:txEl>
+                                              <p:pRg st="3" end="3"/>
+                                            </p:txEl>
+                                          </p:spTgt>
+                                        </p:tgtEl>
+                                        <p:attrNameLst>
+                                          <p:attrName>style.visibility</p:attrName>
+                                        </p:attrNameLst>
+                                      </p:cBhvr>
+                                      <p:to>
+                                        <p:strVal val="visible"/>
+                                      </p:to>
+                                    </p:set>
+                                    <p:animEffect transition="in" filter="fade">
+                                      <p:cBhvr>
+                                        <p:cTn id="18" dur="500"/>
+                                        <p:tgtEl>
+                                          <p:spTgt spid="3">
+                                            <p:txEl>
+                                              <p:pRg st="3" end="3"/>
+                                            </p:txEl>
+                                          </p:spTgt>
+                                        </p:tgtEl>
+                                      </p:cBhvr>
+                                    </p:animEffect>
+                                  </p:childTnLst>
+                                </p:cTn>
+                              </p:par>
+                            </p:childTnLst>
+                          </p:cTn>
+                        </p:par>
+                      </p:childTnLst>
+                    </p:cTn>
+                  </p:par>
+                  <p:par>
+                    <p:cTn id="19" fill="hold">
+                      <p:stCondLst>
+                        <p:cond delay="indefinite"/>
+                      </p:stCondLst>
+                      <p:childTnLst>
+                        <p:par>
+                          <p:cTn id="20" fill="hold">
+                            <p:stCondLst>
+                              <p:cond delay="0"/>
+                            </p:stCondLst>
+                            <p:childTnLst>
+                              <p:par>
+                                <p:cTn id="21" presetID="10" presetClass="entr" presetSubtype="0" fill="hold" grpId="0" nodeType="clickEffect">
+                                  <p:stCondLst>
+                                    <p:cond delay="0"/>
+                                  </p:stCondLst>
+                                  <p:childTnLst>
+                                    <p:set>
+                                      <p:cBhvr>
+                                        <p:cTn id="22" dur="1" fill="hold">
+                                          <p:stCondLst>
+                                            <p:cond delay="0"/>
+                                          </p:stCondLst>
+                                        </p:cTn>
+                                        <p:tgtEl>
+                                          <p:spTgt spid="24"/>
+                                        </p:tgtEl>
+                                        <p:attrNameLst>
+                                          <p:attrName>style.visibility</p:attrName>
+                                        </p:attrNameLst>
+                                      </p:cBhvr>
+                                      <p:to>
+                                        <p:strVal val="visible"/>
+                                      </p:to>
+                                    </p:set>
+                                    <p:animEffect transition="in" filter="fade">
+                                      <p:cBhvr>
+                                        <p:cTn id="23" dur="500"/>
+                                        <p:tgtEl>
+                                          <p:spTgt spid="24"/>
+                                        </p:tgtEl>
+                                      </p:cBhvr>
+                                    </p:animEffect>
+                                  </p:childTnLst>
+                                </p:cTn>
+                              </p:par>
+                            </p:childTnLst>
+                          </p:cTn>
+                        </p:par>
+                      </p:childTnLst>
+                    </p:cTn>
+                  </p:par>
+                </p:childTnLst>
+              </p:cTn>
+              <p:prevCondLst>
+                <p:cond evt="onPrev" delay="0">
+                  <p:tgtEl>
+                    <p:sldTgt/>
+                  </p:tgtEl>
+                </p:cond>
+              </p:prevCondLst>
+              <p:nextCondLst>
+                <p:cond evt="onNext" delay="0">
+                  <p:tgtEl>
+                    <p:sldTgt/>
+                  </p:tgtEl>
+                </p:cond>
+              </p:nextCondLst>
+            </p:seq>
+          </p:childTnLst>
+        </p:cTn>
+      </p:par>
+    </p:tnLst>
+    <p:bldLst>
+      <p:bldP spid="24" grpId="0" animBg="1"/>
+    </p:bldLst>
+  </p:timing>
 </p:sld>
 </file>
 
@@ -31978,8 +34548,8 @@
           </a:p>
         </p:txBody>
       </p:sp>
-      <mc:AlternateContent xmlns:mc="http://schemas.openxmlformats.org/markup-compatibility/2006">
-        <mc:Choice xmlns:a14="http://schemas.microsoft.com/office/drawing/2010/main" Requires="a14">
+      <mc:AlternateContent xmlns:mc="http://schemas.openxmlformats.org/markup-compatibility/2006" xmlns:a14="http://schemas.microsoft.com/office/drawing/2010/main">
+        <mc:Choice Requires="a14">
           <p:sp>
             <p:nvSpPr>
               <p:cNvPr id="3" name="Content Placeholder 2">
@@ -32450,7 +35020,7 @@
             </p:txBody>
           </p:sp>
         </mc:Choice>
-        <mc:Fallback>
+        <mc:Fallback xmlns="">
           <p:sp>
             <p:nvSpPr>
               <p:cNvPr id="3" name="Content Placeholder 2">
@@ -32753,8 +35323,8 @@
           </a:fontRef>
         </p:style>
       </p:cxnSp>
-      <mc:AlternateContent xmlns:mc="http://schemas.openxmlformats.org/markup-compatibility/2006">
-        <mc:Choice xmlns:a14="http://schemas.microsoft.com/office/drawing/2010/main" Requires="a14">
+      <mc:AlternateContent xmlns:mc="http://schemas.openxmlformats.org/markup-compatibility/2006" xmlns:a14="http://schemas.microsoft.com/office/drawing/2010/main">
+        <mc:Choice Requires="a14">
           <p:sp>
             <p:nvSpPr>
               <p:cNvPr id="12" name="TextBox 11">
@@ -32834,7 +35404,7 @@
             </p:txBody>
           </p:sp>
         </mc:Choice>
-        <mc:Fallback>
+        <mc:Fallback xmlns="">
           <p:sp>
             <p:nvSpPr>
               <p:cNvPr id="12" name="TextBox 11">
@@ -32949,8 +35519,8 @@
           </a:p>
         </p:txBody>
       </p:sp>
-      <mc:AlternateContent xmlns:mc="http://schemas.openxmlformats.org/markup-compatibility/2006">
-        <mc:Choice xmlns:a14="http://schemas.microsoft.com/office/drawing/2010/main" Requires="a14">
+      <mc:AlternateContent xmlns:mc="http://schemas.openxmlformats.org/markup-compatibility/2006" xmlns:a14="http://schemas.microsoft.com/office/drawing/2010/main">
+        <mc:Choice Requires="a14">
           <p:sp>
             <p:nvSpPr>
               <p:cNvPr id="15" name="TextBox 14">
@@ -33022,7 +35592,7 @@
             </p:txBody>
           </p:sp>
         </mc:Choice>
-        <mc:Fallback>
+        <mc:Fallback xmlns="">
           <p:sp>
             <p:nvSpPr>
               <p:cNvPr id="15" name="TextBox 14">
@@ -33116,8 +35686,8 @@
           </a:p>
         </p:txBody>
       </p:sp>
-      <mc:AlternateContent xmlns:mc="http://schemas.openxmlformats.org/markup-compatibility/2006">
-        <mc:Choice xmlns:a14="http://schemas.microsoft.com/office/drawing/2010/main" Requires="a14">
+      <mc:AlternateContent xmlns:mc="http://schemas.openxmlformats.org/markup-compatibility/2006" xmlns:a14="http://schemas.microsoft.com/office/drawing/2010/main">
+        <mc:Choice Requires="a14">
           <p:sp>
             <p:nvSpPr>
               <p:cNvPr id="25" name="TextBox 24">
@@ -33195,7 +35765,7 @@
             </p:txBody>
           </p:sp>
         </mc:Choice>
-        <mc:Fallback>
+        <mc:Fallback xmlns="">
           <p:sp>
             <p:nvSpPr>
               <p:cNvPr id="25" name="TextBox 24">
@@ -33240,8 +35810,8 @@
           </p:sp>
         </mc:Fallback>
       </mc:AlternateContent>
-      <mc:AlternateContent xmlns:mc="http://schemas.openxmlformats.org/markup-compatibility/2006">
-        <mc:Choice xmlns:a14="http://schemas.microsoft.com/office/drawing/2010/main" Requires="a14">
+      <mc:AlternateContent xmlns:mc="http://schemas.openxmlformats.org/markup-compatibility/2006" xmlns:a14="http://schemas.microsoft.com/office/drawing/2010/main">
+        <mc:Choice Requires="a14">
           <p:sp>
             <p:nvSpPr>
               <p:cNvPr id="26" name="TextBox 25">
@@ -33363,7 +35933,7 @@
             </p:txBody>
           </p:sp>
         </mc:Choice>
-        <mc:Fallback>
+        <mc:Fallback xmlns="">
           <p:sp>
             <p:nvSpPr>
               <p:cNvPr id="26" name="TextBox 25">
@@ -33467,6 +36037,219 @@
   <p:clrMapOvr>
     <a:masterClrMapping/>
   </p:clrMapOvr>
+  <p:timing>
+    <p:tnLst>
+      <p:par>
+        <p:cTn id="1" dur="indefinite" restart="never" nodeType="tmRoot">
+          <p:childTnLst>
+            <p:seq concurrent="1" nextAc="seek">
+              <p:cTn id="2" dur="indefinite" nodeType="mainSeq">
+                <p:childTnLst>
+                  <p:par>
+                    <p:cTn id="3" fill="hold">
+                      <p:stCondLst>
+                        <p:cond delay="indefinite"/>
+                      </p:stCondLst>
+                      <p:childTnLst>
+                        <p:par>
+                          <p:cTn id="4" fill="hold">
+                            <p:stCondLst>
+                              <p:cond delay="0"/>
+                            </p:stCondLst>
+                            <p:childTnLst>
+                              <p:par>
+                                <p:cTn id="5" presetID="10" presetClass="entr" presetSubtype="0" fill="hold" nodeType="clickEffect">
+                                  <p:stCondLst>
+                                    <p:cond delay="0"/>
+                                  </p:stCondLst>
+                                  <p:childTnLst>
+                                    <p:set>
+                                      <p:cBhvr>
+                                        <p:cTn id="6" dur="1" fill="hold">
+                                          <p:stCondLst>
+                                            <p:cond delay="0"/>
+                                          </p:stCondLst>
+                                        </p:cTn>
+                                        <p:tgtEl>
+                                          <p:spTgt spid="3">
+                                            <p:txEl>
+                                              <p:pRg st="1" end="1"/>
+                                            </p:txEl>
+                                          </p:spTgt>
+                                        </p:tgtEl>
+                                        <p:attrNameLst>
+                                          <p:attrName>style.visibility</p:attrName>
+                                        </p:attrNameLst>
+                                      </p:cBhvr>
+                                      <p:to>
+                                        <p:strVal val="visible"/>
+                                      </p:to>
+                                    </p:set>
+                                    <p:animEffect transition="in" filter="fade">
+                                      <p:cBhvr>
+                                        <p:cTn id="7" dur="500"/>
+                                        <p:tgtEl>
+                                          <p:spTgt spid="3">
+                                            <p:txEl>
+                                              <p:pRg st="1" end="1"/>
+                                            </p:txEl>
+                                          </p:spTgt>
+                                        </p:tgtEl>
+                                      </p:cBhvr>
+                                    </p:animEffect>
+                                  </p:childTnLst>
+                                </p:cTn>
+                              </p:par>
+                            </p:childTnLst>
+                          </p:cTn>
+                        </p:par>
+                      </p:childTnLst>
+                    </p:cTn>
+                  </p:par>
+                  <p:par>
+                    <p:cTn id="8" fill="hold">
+                      <p:stCondLst>
+                        <p:cond delay="indefinite"/>
+                      </p:stCondLst>
+                      <p:childTnLst>
+                        <p:par>
+                          <p:cTn id="9" fill="hold">
+                            <p:stCondLst>
+                              <p:cond delay="0"/>
+                            </p:stCondLst>
+                            <p:childTnLst>
+                              <p:par>
+                                <p:cTn id="10" presetID="10" presetClass="entr" presetSubtype="0" fill="hold" nodeType="clickEffect">
+                                  <p:stCondLst>
+                                    <p:cond delay="0"/>
+                                  </p:stCondLst>
+                                  <p:childTnLst>
+                                    <p:set>
+                                      <p:cBhvr>
+                                        <p:cTn id="11" dur="1" fill="hold">
+                                          <p:stCondLst>
+                                            <p:cond delay="0"/>
+                                          </p:stCondLst>
+                                        </p:cTn>
+                                        <p:tgtEl>
+                                          <p:spTgt spid="3">
+                                            <p:txEl>
+                                              <p:pRg st="2" end="2"/>
+                                            </p:txEl>
+                                          </p:spTgt>
+                                        </p:tgtEl>
+                                        <p:attrNameLst>
+                                          <p:attrName>style.visibility</p:attrName>
+                                        </p:attrNameLst>
+                                      </p:cBhvr>
+                                      <p:to>
+                                        <p:strVal val="visible"/>
+                                      </p:to>
+                                    </p:set>
+                                    <p:animEffect transition="in" filter="fade">
+                                      <p:cBhvr>
+                                        <p:cTn id="12" dur="500"/>
+                                        <p:tgtEl>
+                                          <p:spTgt spid="3">
+                                            <p:txEl>
+                                              <p:pRg st="2" end="2"/>
+                                            </p:txEl>
+                                          </p:spTgt>
+                                        </p:tgtEl>
+                                      </p:cBhvr>
+                                    </p:animEffect>
+                                  </p:childTnLst>
+                                </p:cTn>
+                              </p:par>
+                            </p:childTnLst>
+                          </p:cTn>
+                        </p:par>
+                      </p:childTnLst>
+                    </p:cTn>
+                  </p:par>
+                  <p:par>
+                    <p:cTn id="13" fill="hold">
+                      <p:stCondLst>
+                        <p:cond delay="indefinite"/>
+                      </p:stCondLst>
+                      <p:childTnLst>
+                        <p:par>
+                          <p:cTn id="14" fill="hold">
+                            <p:stCondLst>
+                              <p:cond delay="0"/>
+                            </p:stCondLst>
+                            <p:childTnLst>
+                              <p:par>
+                                <p:cTn id="15" presetID="10" presetClass="entr" presetSubtype="0" fill="hold" nodeType="clickEffect">
+                                  <p:stCondLst>
+                                    <p:cond delay="0"/>
+                                  </p:stCondLst>
+                                  <p:childTnLst>
+                                    <p:set>
+                                      <p:cBhvr>
+                                        <p:cTn id="16" dur="1" fill="hold">
+                                          <p:stCondLst>
+                                            <p:cond delay="0"/>
+                                          </p:stCondLst>
+                                        </p:cTn>
+                                        <p:tgtEl>
+                                          <p:spTgt spid="3">
+                                            <p:txEl>
+                                              <p:pRg st="3" end="3"/>
+                                            </p:txEl>
+                                          </p:spTgt>
+                                        </p:tgtEl>
+                                        <p:attrNameLst>
+                                          <p:attrName>style.visibility</p:attrName>
+                                        </p:attrNameLst>
+                                      </p:cBhvr>
+                                      <p:to>
+                                        <p:strVal val="visible"/>
+                                      </p:to>
+                                    </p:set>
+                                    <p:animEffect transition="in" filter="fade">
+                                      <p:cBhvr>
+                                        <p:cTn id="17" dur="500"/>
+                                        <p:tgtEl>
+                                          <p:spTgt spid="3">
+                                            <p:txEl>
+                                              <p:pRg st="3" end="3"/>
+                                            </p:txEl>
+                                          </p:spTgt>
+                                        </p:tgtEl>
+                                      </p:cBhvr>
+                                    </p:animEffect>
+                                  </p:childTnLst>
+                                </p:cTn>
+                              </p:par>
+                            </p:childTnLst>
+                          </p:cTn>
+                        </p:par>
+                      </p:childTnLst>
+                    </p:cTn>
+                  </p:par>
+                </p:childTnLst>
+              </p:cTn>
+              <p:prevCondLst>
+                <p:cond evt="onPrev" delay="0">
+                  <p:tgtEl>
+                    <p:sldTgt/>
+                  </p:tgtEl>
+                </p:cond>
+              </p:prevCondLst>
+              <p:nextCondLst>
+                <p:cond evt="onNext" delay="0">
+                  <p:tgtEl>
+                    <p:sldTgt/>
+                  </p:tgtEl>
+                </p:cond>
+              </p:nextCondLst>
+            </p:seq>
+          </p:childTnLst>
+        </p:cTn>
+      </p:par>
+    </p:tnLst>
+  </p:timing>
 </p:sld>
 </file>
 
@@ -34832,7 +37615,7 @@
         <p:spPr>
           <a:xfrm>
             <a:off x="6265026" y="4850695"/>
-            <a:ext cx="1297278" cy="369332"/>
+            <a:ext cx="987771" cy="369332"/>
           </a:xfrm>
           <a:prstGeom prst="rect">
             <a:avLst/>
@@ -34847,7 +37630,7 @@
           <a:p>
             <a:r>
               <a:rPr lang="en-US" dirty="0"/>
-              <a:t>Today’s unit</a:t>
+              <a:t>This unit</a:t>
             </a:r>
           </a:p>
         </p:txBody>
@@ -35744,6 +38527,545 @@
   <p:clrMapOvr>
     <a:masterClrMapping/>
   </p:clrMapOvr>
+  <p:timing>
+    <p:tnLst>
+      <p:par>
+        <p:cTn id="1" dur="indefinite" restart="never" nodeType="tmRoot">
+          <p:childTnLst>
+            <p:seq concurrent="1" nextAc="seek">
+              <p:cTn id="2" dur="indefinite" nodeType="mainSeq">
+                <p:childTnLst>
+                  <p:par>
+                    <p:cTn id="3" fill="hold">
+                      <p:stCondLst>
+                        <p:cond delay="indefinite"/>
+                      </p:stCondLst>
+                      <p:childTnLst>
+                        <p:par>
+                          <p:cTn id="4" fill="hold">
+                            <p:stCondLst>
+                              <p:cond delay="0"/>
+                            </p:stCondLst>
+                            <p:childTnLst>
+                              <p:par>
+                                <p:cTn id="5" presetID="10" presetClass="entr" presetSubtype="0" fill="hold" nodeType="clickEffect">
+                                  <p:stCondLst>
+                                    <p:cond delay="0"/>
+                                  </p:stCondLst>
+                                  <p:childTnLst>
+                                    <p:set>
+                                      <p:cBhvr>
+                                        <p:cTn id="6" dur="1" fill="hold">
+                                          <p:stCondLst>
+                                            <p:cond delay="0"/>
+                                          </p:stCondLst>
+                                        </p:cTn>
+                                        <p:tgtEl>
+                                          <p:spTgt spid="3">
+                                            <p:txEl>
+                                              <p:pRg st="0" end="0"/>
+                                            </p:txEl>
+                                          </p:spTgt>
+                                        </p:tgtEl>
+                                        <p:attrNameLst>
+                                          <p:attrName>style.visibility</p:attrName>
+                                        </p:attrNameLst>
+                                      </p:cBhvr>
+                                      <p:to>
+                                        <p:strVal val="visible"/>
+                                      </p:to>
+                                    </p:set>
+                                    <p:animEffect transition="in" filter="fade">
+                                      <p:cBhvr>
+                                        <p:cTn id="7" dur="500"/>
+                                        <p:tgtEl>
+                                          <p:spTgt spid="3">
+                                            <p:txEl>
+                                              <p:pRg st="0" end="0"/>
+                                            </p:txEl>
+                                          </p:spTgt>
+                                        </p:tgtEl>
+                                      </p:cBhvr>
+                                    </p:animEffect>
+                                  </p:childTnLst>
+                                </p:cTn>
+                              </p:par>
+                              <p:par>
+                                <p:cTn id="8" presetID="10" presetClass="entr" presetSubtype="0" fill="hold" nodeType="withEffect">
+                                  <p:stCondLst>
+                                    <p:cond delay="0"/>
+                                  </p:stCondLst>
+                                  <p:childTnLst>
+                                    <p:set>
+                                      <p:cBhvr>
+                                        <p:cTn id="9" dur="1" fill="hold">
+                                          <p:stCondLst>
+                                            <p:cond delay="0"/>
+                                          </p:stCondLst>
+                                        </p:cTn>
+                                        <p:tgtEl>
+                                          <p:spTgt spid="3">
+                                            <p:txEl>
+                                              <p:pRg st="1" end="1"/>
+                                            </p:txEl>
+                                          </p:spTgt>
+                                        </p:tgtEl>
+                                        <p:attrNameLst>
+                                          <p:attrName>style.visibility</p:attrName>
+                                        </p:attrNameLst>
+                                      </p:cBhvr>
+                                      <p:to>
+                                        <p:strVal val="visible"/>
+                                      </p:to>
+                                    </p:set>
+                                    <p:animEffect transition="in" filter="fade">
+                                      <p:cBhvr>
+                                        <p:cTn id="10" dur="500"/>
+                                        <p:tgtEl>
+                                          <p:spTgt spid="3">
+                                            <p:txEl>
+                                              <p:pRg st="1" end="1"/>
+                                            </p:txEl>
+                                          </p:spTgt>
+                                        </p:tgtEl>
+                                      </p:cBhvr>
+                                    </p:animEffect>
+                                  </p:childTnLst>
+                                </p:cTn>
+                              </p:par>
+                              <p:par>
+                                <p:cTn id="11" presetID="10" presetClass="entr" presetSubtype="0" fill="hold" nodeType="withEffect">
+                                  <p:stCondLst>
+                                    <p:cond delay="0"/>
+                                  </p:stCondLst>
+                                  <p:childTnLst>
+                                    <p:set>
+                                      <p:cBhvr>
+                                        <p:cTn id="12" dur="1" fill="hold">
+                                          <p:stCondLst>
+                                            <p:cond delay="0"/>
+                                          </p:stCondLst>
+                                        </p:cTn>
+                                        <p:tgtEl>
+                                          <p:spTgt spid="3">
+                                            <p:txEl>
+                                              <p:pRg st="2" end="2"/>
+                                            </p:txEl>
+                                          </p:spTgt>
+                                        </p:tgtEl>
+                                        <p:attrNameLst>
+                                          <p:attrName>style.visibility</p:attrName>
+                                        </p:attrNameLst>
+                                      </p:cBhvr>
+                                      <p:to>
+                                        <p:strVal val="visible"/>
+                                      </p:to>
+                                    </p:set>
+                                    <p:animEffect transition="in" filter="fade">
+                                      <p:cBhvr>
+                                        <p:cTn id="13" dur="500"/>
+                                        <p:tgtEl>
+                                          <p:spTgt spid="3">
+                                            <p:txEl>
+                                              <p:pRg st="2" end="2"/>
+                                            </p:txEl>
+                                          </p:spTgt>
+                                        </p:tgtEl>
+                                      </p:cBhvr>
+                                    </p:animEffect>
+                                  </p:childTnLst>
+                                </p:cTn>
+                              </p:par>
+                              <p:par>
+                                <p:cTn id="14" presetID="10" presetClass="entr" presetSubtype="0" fill="hold" nodeType="withEffect">
+                                  <p:stCondLst>
+                                    <p:cond delay="0"/>
+                                  </p:stCondLst>
+                                  <p:childTnLst>
+                                    <p:set>
+                                      <p:cBhvr>
+                                        <p:cTn id="15" dur="1" fill="hold">
+                                          <p:stCondLst>
+                                            <p:cond delay="0"/>
+                                          </p:stCondLst>
+                                        </p:cTn>
+                                        <p:tgtEl>
+                                          <p:spTgt spid="3">
+                                            <p:txEl>
+                                              <p:pRg st="3" end="3"/>
+                                            </p:txEl>
+                                          </p:spTgt>
+                                        </p:tgtEl>
+                                        <p:attrNameLst>
+                                          <p:attrName>style.visibility</p:attrName>
+                                        </p:attrNameLst>
+                                      </p:cBhvr>
+                                      <p:to>
+                                        <p:strVal val="visible"/>
+                                      </p:to>
+                                    </p:set>
+                                    <p:animEffect transition="in" filter="fade">
+                                      <p:cBhvr>
+                                        <p:cTn id="16" dur="500"/>
+                                        <p:tgtEl>
+                                          <p:spTgt spid="3">
+                                            <p:txEl>
+                                              <p:pRg st="3" end="3"/>
+                                            </p:txEl>
+                                          </p:spTgt>
+                                        </p:tgtEl>
+                                      </p:cBhvr>
+                                    </p:animEffect>
+                                  </p:childTnLst>
+                                </p:cTn>
+                              </p:par>
+                              <p:par>
+                                <p:cTn id="17" presetID="10" presetClass="entr" presetSubtype="0" fill="hold" nodeType="withEffect">
+                                  <p:stCondLst>
+                                    <p:cond delay="0"/>
+                                  </p:stCondLst>
+                                  <p:childTnLst>
+                                    <p:set>
+                                      <p:cBhvr>
+                                        <p:cTn id="18" dur="1" fill="hold">
+                                          <p:stCondLst>
+                                            <p:cond delay="0"/>
+                                          </p:stCondLst>
+                                        </p:cTn>
+                                        <p:tgtEl>
+                                          <p:spTgt spid="3">
+                                            <p:txEl>
+                                              <p:pRg st="4" end="4"/>
+                                            </p:txEl>
+                                          </p:spTgt>
+                                        </p:tgtEl>
+                                        <p:attrNameLst>
+                                          <p:attrName>style.visibility</p:attrName>
+                                        </p:attrNameLst>
+                                      </p:cBhvr>
+                                      <p:to>
+                                        <p:strVal val="visible"/>
+                                      </p:to>
+                                    </p:set>
+                                    <p:animEffect transition="in" filter="fade">
+                                      <p:cBhvr>
+                                        <p:cTn id="19" dur="500"/>
+                                        <p:tgtEl>
+                                          <p:spTgt spid="3">
+                                            <p:txEl>
+                                              <p:pRg st="4" end="4"/>
+                                            </p:txEl>
+                                          </p:spTgt>
+                                        </p:tgtEl>
+                                      </p:cBhvr>
+                                    </p:animEffect>
+                                  </p:childTnLst>
+                                </p:cTn>
+                              </p:par>
+                            </p:childTnLst>
+                          </p:cTn>
+                        </p:par>
+                      </p:childTnLst>
+                    </p:cTn>
+                  </p:par>
+                  <p:par>
+                    <p:cTn id="20" fill="hold">
+                      <p:stCondLst>
+                        <p:cond delay="indefinite"/>
+                      </p:stCondLst>
+                      <p:childTnLst>
+                        <p:par>
+                          <p:cTn id="21" fill="hold">
+                            <p:stCondLst>
+                              <p:cond delay="0"/>
+                            </p:stCondLst>
+                            <p:childTnLst>
+                              <p:par>
+                                <p:cTn id="22" presetID="10" presetClass="entr" presetSubtype="0" fill="hold" nodeType="clickEffect">
+                                  <p:stCondLst>
+                                    <p:cond delay="0"/>
+                                  </p:stCondLst>
+                                  <p:childTnLst>
+                                    <p:set>
+                                      <p:cBhvr>
+                                        <p:cTn id="23" dur="1" fill="hold">
+                                          <p:stCondLst>
+                                            <p:cond delay="0"/>
+                                          </p:stCondLst>
+                                        </p:cTn>
+                                        <p:tgtEl>
+                                          <p:spTgt spid="3">
+                                            <p:txEl>
+                                              <p:pRg st="6" end="6"/>
+                                            </p:txEl>
+                                          </p:spTgt>
+                                        </p:tgtEl>
+                                        <p:attrNameLst>
+                                          <p:attrName>style.visibility</p:attrName>
+                                        </p:attrNameLst>
+                                      </p:cBhvr>
+                                      <p:to>
+                                        <p:strVal val="visible"/>
+                                      </p:to>
+                                    </p:set>
+                                    <p:animEffect transition="in" filter="fade">
+                                      <p:cBhvr>
+                                        <p:cTn id="24" dur="500"/>
+                                        <p:tgtEl>
+                                          <p:spTgt spid="3">
+                                            <p:txEl>
+                                              <p:pRg st="6" end="6"/>
+                                            </p:txEl>
+                                          </p:spTgt>
+                                        </p:tgtEl>
+                                      </p:cBhvr>
+                                    </p:animEffect>
+                                  </p:childTnLst>
+                                </p:cTn>
+                              </p:par>
+                              <p:par>
+                                <p:cTn id="25" presetID="10" presetClass="entr" presetSubtype="0" fill="hold" nodeType="withEffect">
+                                  <p:stCondLst>
+                                    <p:cond delay="0"/>
+                                  </p:stCondLst>
+                                  <p:childTnLst>
+                                    <p:set>
+                                      <p:cBhvr>
+                                        <p:cTn id="26" dur="1" fill="hold">
+                                          <p:stCondLst>
+                                            <p:cond delay="0"/>
+                                          </p:stCondLst>
+                                        </p:cTn>
+                                        <p:tgtEl>
+                                          <p:spTgt spid="3">
+                                            <p:txEl>
+                                              <p:pRg st="7" end="7"/>
+                                            </p:txEl>
+                                          </p:spTgt>
+                                        </p:tgtEl>
+                                        <p:attrNameLst>
+                                          <p:attrName>style.visibility</p:attrName>
+                                        </p:attrNameLst>
+                                      </p:cBhvr>
+                                      <p:to>
+                                        <p:strVal val="visible"/>
+                                      </p:to>
+                                    </p:set>
+                                    <p:animEffect transition="in" filter="fade">
+                                      <p:cBhvr>
+                                        <p:cTn id="27" dur="500"/>
+                                        <p:tgtEl>
+                                          <p:spTgt spid="3">
+                                            <p:txEl>
+                                              <p:pRg st="7" end="7"/>
+                                            </p:txEl>
+                                          </p:spTgt>
+                                        </p:tgtEl>
+                                      </p:cBhvr>
+                                    </p:animEffect>
+                                  </p:childTnLst>
+                                </p:cTn>
+                              </p:par>
+                              <p:par>
+                                <p:cTn id="28" presetID="10" presetClass="entr" presetSubtype="0" fill="hold" nodeType="withEffect">
+                                  <p:stCondLst>
+                                    <p:cond delay="0"/>
+                                  </p:stCondLst>
+                                  <p:childTnLst>
+                                    <p:set>
+                                      <p:cBhvr>
+                                        <p:cTn id="29" dur="1" fill="hold">
+                                          <p:stCondLst>
+                                            <p:cond delay="0"/>
+                                          </p:stCondLst>
+                                        </p:cTn>
+                                        <p:tgtEl>
+                                          <p:spTgt spid="3">
+                                            <p:txEl>
+                                              <p:pRg st="8" end="8"/>
+                                            </p:txEl>
+                                          </p:spTgt>
+                                        </p:tgtEl>
+                                        <p:attrNameLst>
+                                          <p:attrName>style.visibility</p:attrName>
+                                        </p:attrNameLst>
+                                      </p:cBhvr>
+                                      <p:to>
+                                        <p:strVal val="visible"/>
+                                      </p:to>
+                                    </p:set>
+                                    <p:animEffect transition="in" filter="fade">
+                                      <p:cBhvr>
+                                        <p:cTn id="30" dur="500"/>
+                                        <p:tgtEl>
+                                          <p:spTgt spid="3">
+                                            <p:txEl>
+                                              <p:pRg st="8" end="8"/>
+                                            </p:txEl>
+                                          </p:spTgt>
+                                        </p:tgtEl>
+                                      </p:cBhvr>
+                                    </p:animEffect>
+                                  </p:childTnLst>
+                                </p:cTn>
+                              </p:par>
+                              <p:par>
+                                <p:cTn id="31" presetID="10" presetClass="entr" presetSubtype="0" fill="hold" nodeType="withEffect">
+                                  <p:stCondLst>
+                                    <p:cond delay="0"/>
+                                  </p:stCondLst>
+                                  <p:childTnLst>
+                                    <p:set>
+                                      <p:cBhvr>
+                                        <p:cTn id="32" dur="1" fill="hold">
+                                          <p:stCondLst>
+                                            <p:cond delay="0"/>
+                                          </p:stCondLst>
+                                        </p:cTn>
+                                        <p:tgtEl>
+                                          <p:spTgt spid="3">
+                                            <p:txEl>
+                                              <p:pRg st="9" end="9"/>
+                                            </p:txEl>
+                                          </p:spTgt>
+                                        </p:tgtEl>
+                                        <p:attrNameLst>
+                                          <p:attrName>style.visibility</p:attrName>
+                                        </p:attrNameLst>
+                                      </p:cBhvr>
+                                      <p:to>
+                                        <p:strVal val="visible"/>
+                                      </p:to>
+                                    </p:set>
+                                    <p:animEffect transition="in" filter="fade">
+                                      <p:cBhvr>
+                                        <p:cTn id="33" dur="500"/>
+                                        <p:tgtEl>
+                                          <p:spTgt spid="3">
+                                            <p:txEl>
+                                              <p:pRg st="9" end="9"/>
+                                            </p:txEl>
+                                          </p:spTgt>
+                                        </p:tgtEl>
+                                      </p:cBhvr>
+                                    </p:animEffect>
+                                  </p:childTnLst>
+                                </p:cTn>
+                              </p:par>
+                              <p:par>
+                                <p:cTn id="34" presetID="10" presetClass="entr" presetSubtype="0" fill="hold" nodeType="withEffect">
+                                  <p:stCondLst>
+                                    <p:cond delay="0"/>
+                                  </p:stCondLst>
+                                  <p:childTnLst>
+                                    <p:set>
+                                      <p:cBhvr>
+                                        <p:cTn id="35" dur="1" fill="hold">
+                                          <p:stCondLst>
+                                            <p:cond delay="0"/>
+                                          </p:stCondLst>
+                                        </p:cTn>
+                                        <p:tgtEl>
+                                          <p:spTgt spid="3">
+                                            <p:txEl>
+                                              <p:pRg st="10" end="10"/>
+                                            </p:txEl>
+                                          </p:spTgt>
+                                        </p:tgtEl>
+                                        <p:attrNameLst>
+                                          <p:attrName>style.visibility</p:attrName>
+                                        </p:attrNameLst>
+                                      </p:cBhvr>
+                                      <p:to>
+                                        <p:strVal val="visible"/>
+                                      </p:to>
+                                    </p:set>
+                                    <p:animEffect transition="in" filter="fade">
+                                      <p:cBhvr>
+                                        <p:cTn id="36" dur="500"/>
+                                        <p:tgtEl>
+                                          <p:spTgt spid="3">
+                                            <p:txEl>
+                                              <p:pRg st="10" end="10"/>
+                                            </p:txEl>
+                                          </p:spTgt>
+                                        </p:tgtEl>
+                                      </p:cBhvr>
+                                    </p:animEffect>
+                                  </p:childTnLst>
+                                </p:cTn>
+                              </p:par>
+                              <p:par>
+                                <p:cTn id="37" presetID="10" presetClass="entr" presetSubtype="0" fill="hold" nodeType="withEffect">
+                                  <p:stCondLst>
+                                    <p:cond delay="0"/>
+                                  </p:stCondLst>
+                                  <p:childTnLst>
+                                    <p:set>
+                                      <p:cBhvr>
+                                        <p:cTn id="38" dur="1" fill="hold">
+                                          <p:stCondLst>
+                                            <p:cond delay="0"/>
+                                          </p:stCondLst>
+                                        </p:cTn>
+                                        <p:tgtEl>
+                                          <p:spTgt spid="3">
+                                            <p:txEl>
+                                              <p:pRg st="11" end="11"/>
+                                            </p:txEl>
+                                          </p:spTgt>
+                                        </p:tgtEl>
+                                        <p:attrNameLst>
+                                          <p:attrName>style.visibility</p:attrName>
+                                        </p:attrNameLst>
+                                      </p:cBhvr>
+                                      <p:to>
+                                        <p:strVal val="visible"/>
+                                      </p:to>
+                                    </p:set>
+                                    <p:animEffect transition="in" filter="fade">
+                                      <p:cBhvr>
+                                        <p:cTn id="39" dur="500"/>
+                                        <p:tgtEl>
+                                          <p:spTgt spid="3">
+                                            <p:txEl>
+                                              <p:pRg st="11" end="11"/>
+                                            </p:txEl>
+                                          </p:spTgt>
+                                        </p:tgtEl>
+                                      </p:cBhvr>
+                                    </p:animEffect>
+                                  </p:childTnLst>
+                                </p:cTn>
+                              </p:par>
+                            </p:childTnLst>
+                          </p:cTn>
+                        </p:par>
+                      </p:childTnLst>
+                    </p:cTn>
+                  </p:par>
+                </p:childTnLst>
+              </p:cTn>
+              <p:prevCondLst>
+                <p:cond evt="onPrev" delay="0">
+                  <p:tgtEl>
+                    <p:sldTgt/>
+                  </p:tgtEl>
+                </p:cond>
+              </p:prevCondLst>
+              <p:nextCondLst>
+                <p:cond evt="onNext" delay="0">
+                  <p:tgtEl>
+                    <p:sldTgt/>
+                  </p:tgtEl>
+                </p:cond>
+              </p:nextCondLst>
+            </p:seq>
+          </p:childTnLst>
+        </p:cTn>
+      </p:par>
+    </p:tnLst>
+  </p:timing>
 </p:sld>
 </file>
 

</xml_diff>